<commit_message>
Day 6 - Slides
</commit_message>
<xml_diff>
--- a/Day 5/Slides/3. Backing Up Volumes/backing-up-volumes-slides.pptx
+++ b/Day 5/Slides/3. Backing Up Volumes/backing-up-volumes-slides.pptx
@@ -5,7 +5,7 @@
     <p:sldMasterId id="2147483648" r:id="rId1"/>
   </p:sldMasterIdLst>
   <p:notesMasterIdLst>
-    <p:notesMasterId r:id="rId39"/>
+    <p:notesMasterId r:id="rId31"/>
   </p:notesMasterIdLst>
   <p:sldIdLst>
     <p:sldId id="256" r:id="rId3"/>
@@ -35,15 +35,7 @@
     <p:sldId id="280" r:id="rId27"/>
     <p:sldId id="281" r:id="rId28"/>
     <p:sldId id="282" r:id="rId29"/>
-    <p:sldId id="283" r:id="rId30"/>
-    <p:sldId id="284" r:id="rId31"/>
-    <p:sldId id="285" r:id="rId32"/>
-    <p:sldId id="286" r:id="rId33"/>
-    <p:sldId id="287" r:id="rId34"/>
-    <p:sldId id="288" r:id="rId35"/>
-    <p:sldId id="289" r:id="rId36"/>
-    <p:sldId id="290" r:id="rId37"/>
-    <p:sldId id="291" r:id="rId38"/>
+    <p:sldId id="291" r:id="rId30"/>
   </p:sldIdLst>
   <p:sldSz cx="12192000" cy="6858000"/>
   <p:notesSz cx="12192000" cy="6858000"/>
@@ -12154,7 +12146,7 @@
         </p:blipFill>
         <p:spPr>
           <a:xfrm>
-            <a:off x="5240146" y="839724"/>
+            <a:off x="5240146" y="2211324"/>
             <a:ext cx="4463796" cy="365760"/>
           </a:xfrm>
           <a:prstGeom prst="rect">
@@ -12176,7 +12168,7 @@
         </p:blipFill>
         <p:spPr>
           <a:xfrm>
-            <a:off x="5240146" y="1434083"/>
+            <a:off x="5240146" y="2805683"/>
             <a:ext cx="3257930" cy="365760"/>
           </a:xfrm>
           <a:prstGeom prst="rect">
@@ -12198,7 +12190,7 @@
         </p:blipFill>
         <p:spPr>
           <a:xfrm>
-            <a:off x="5240146" y="2028698"/>
+            <a:off x="5240146" y="3400298"/>
             <a:ext cx="2475356" cy="365760"/>
           </a:xfrm>
           <a:prstGeom prst="rect">
@@ -12220,7 +12212,7 @@
         </p:blipFill>
         <p:spPr>
           <a:xfrm>
-            <a:off x="5240146" y="2623057"/>
+            <a:off x="5240146" y="3994657"/>
             <a:ext cx="4813300" cy="365760"/>
           </a:xfrm>
           <a:prstGeom prst="rect">
@@ -12230,146 +12222,12 @@
       </p:pic>
       <p:pic>
         <p:nvPicPr>
-          <p:cNvPr id="7" name="object 7"/>
+          <p:cNvPr id="12" name="object 12"/>
           <p:cNvPicPr/>
           <p:nvPr/>
         </p:nvPicPr>
         <p:blipFill>
           <a:blip r:embed="rId6" cstate="print"/>
-          <a:stretch>
-            <a:fillRect/>
-          </a:stretch>
-        </p:blipFill>
-        <p:spPr>
-          <a:xfrm>
-            <a:off x="5240146" y="3217798"/>
-            <a:ext cx="3180842" cy="365760"/>
-          </a:xfrm>
-          <a:prstGeom prst="rect">
-            <a:avLst/>
-          </a:prstGeom>
-        </p:spPr>
-      </p:pic>
-      <p:sp>
-        <p:nvSpPr>
-          <p:cNvPr id="8" name="object 8"/>
-          <p:cNvSpPr txBox="1"/>
-          <p:nvPr/>
-        </p:nvSpPr>
-        <p:spPr>
-          <a:xfrm>
-            <a:off x="5466715" y="3711067"/>
-            <a:ext cx="116839" cy="299720"/>
-          </a:xfrm>
-          <a:prstGeom prst="rect">
-            <a:avLst/>
-          </a:prstGeom>
-        </p:spPr>
-        <p:txBody>
-          <a:bodyPr vert="horz" wrap="square" lIns="0" tIns="12700" rIns="0" bIns="0" rtlCol="0">
-            <a:spAutoFit/>
-          </a:bodyPr>
-          <a:lstStyle/>
-          <a:p>
-            <a:pPr marL="12700">
-              <a:lnSpc>
-                <a:spcPct val="100000"/>
-              </a:lnSpc>
-              <a:spcBef>
-                <a:spcPts val="100"/>
-              </a:spcBef>
-            </a:pPr>
-            <a:r>
-              <a:rPr sz="1800" dirty="0">
-                <a:solidFill>
-                  <a:srgbClr val="EF5A28"/>
-                </a:solidFill>
-                <a:latin typeface="Segoe UI" panose="020B0502040204020203"/>
-                <a:cs typeface="Segoe UI" panose="020B0502040204020203"/>
-              </a:rPr>
-              <a:t>-</a:t>
-            </a:r>
-            <a:endParaRPr sz="1800">
-              <a:latin typeface="Segoe UI" panose="020B0502040204020203"/>
-              <a:cs typeface="Segoe UI" panose="020B0502040204020203"/>
-            </a:endParaRPr>
-          </a:p>
-        </p:txBody>
-      </p:sp>
-      <p:pic>
-        <p:nvPicPr>
-          <p:cNvPr id="9" name="object 9"/>
-          <p:cNvPicPr/>
-          <p:nvPr/>
-        </p:nvPicPr>
-        <p:blipFill>
-          <a:blip r:embed="rId7" cstate="print"/>
-          <a:stretch>
-            <a:fillRect/>
-          </a:stretch>
-        </p:blipFill>
-        <p:spPr>
-          <a:xfrm>
-            <a:off x="5768975" y="3659759"/>
-            <a:ext cx="2594355" cy="365760"/>
-          </a:xfrm>
-          <a:prstGeom prst="rect">
-            <a:avLst/>
-          </a:prstGeom>
-        </p:spPr>
-      </p:pic>
-      <p:pic>
-        <p:nvPicPr>
-          <p:cNvPr id="10" name="object 10"/>
-          <p:cNvPicPr/>
-          <p:nvPr/>
-        </p:nvPicPr>
-        <p:blipFill>
-          <a:blip r:embed="rId8" cstate="print"/>
-          <a:stretch>
-            <a:fillRect/>
-          </a:stretch>
-        </p:blipFill>
-        <p:spPr>
-          <a:xfrm>
-            <a:off x="5182234" y="4253814"/>
-            <a:ext cx="4813426" cy="366064"/>
-          </a:xfrm>
-          <a:prstGeom prst="rect">
-            <a:avLst/>
-          </a:prstGeom>
-        </p:spPr>
-      </p:pic>
-      <p:pic>
-        <p:nvPicPr>
-          <p:cNvPr id="11" name="object 11"/>
-          <p:cNvPicPr/>
-          <p:nvPr/>
-        </p:nvPicPr>
-        <p:blipFill>
-          <a:blip r:embed="rId9" cstate="print"/>
-          <a:stretch>
-            <a:fillRect/>
-          </a:stretch>
-        </p:blipFill>
-        <p:spPr>
-          <a:xfrm>
-            <a:off x="5182234" y="4848733"/>
-            <a:ext cx="2814574" cy="365760"/>
-          </a:xfrm>
-          <a:prstGeom prst="rect">
-            <a:avLst/>
-          </a:prstGeom>
-        </p:spPr>
-      </p:pic>
-      <p:pic>
-        <p:nvPicPr>
-          <p:cNvPr id="12" name="object 12"/>
-          <p:cNvPicPr/>
-          <p:nvPr/>
-        </p:nvPicPr>
-        <p:blipFill>
-          <a:blip r:embed="rId10" cstate="print"/>
           <a:stretch>
             <a:fillRect/>
           </a:stretch>
@@ -17538,46 +17396,6 @@
           <a:chExt cx="0" cy="0"/>
         </a:xfrm>
       </p:grpSpPr>
-      <p:sp>
-        <p:nvSpPr>
-          <p:cNvPr id="2" name="object 2"/>
-          <p:cNvSpPr/>
-          <p:nvPr/>
-        </p:nvSpPr>
-        <p:spPr>
-          <a:xfrm>
-            <a:off x="6096761" y="1762505"/>
-            <a:ext cx="0" cy="4645660"/>
-          </a:xfrm>
-          <a:custGeom>
-            <a:avLst/>
-            <a:gdLst/>
-            <a:ahLst/>
-            <a:cxnLst/>
-            <a:rect l="l" t="t" r="r" b="b"/>
-            <a:pathLst>
-              <a:path h="4645660">
-                <a:moveTo>
-                  <a:pt x="0" y="0"/>
-                </a:moveTo>
-                <a:lnTo>
-                  <a:pt x="0" y="4645482"/>
-                </a:lnTo>
-              </a:path>
-            </a:pathLst>
-          </a:custGeom>
-          <a:ln w="25908">
-            <a:solidFill>
-              <a:srgbClr val="EF5A28"/>
-            </a:solidFill>
-          </a:ln>
-        </p:spPr>
-        <p:txBody>
-          <a:bodyPr wrap="square" lIns="0" tIns="0" rIns="0" bIns="0" rtlCol="0"/>
-          <a:lstStyle/>
-          <a:p/>
-        </p:txBody>
-      </p:sp>
       <p:pic>
         <p:nvPicPr>
           <p:cNvPr id="3" name="object 3"/>
@@ -17592,7 +17410,7 @@
         </p:blipFill>
         <p:spPr>
           <a:xfrm>
-            <a:off x="2442717" y="1762632"/>
+            <a:off x="4876672" y="2133472"/>
             <a:ext cx="3578225" cy="365760"/>
           </a:xfrm>
           <a:prstGeom prst="rect">
@@ -17614,7 +17432,7 @@
         </p:blipFill>
         <p:spPr>
           <a:xfrm>
-            <a:off x="3381502" y="2399029"/>
+            <a:off x="5815457" y="2769869"/>
             <a:ext cx="2622550" cy="304800"/>
           </a:xfrm>
           <a:prstGeom prst="rect">
@@ -17636,7 +17454,7 @@
         </p:blipFill>
         <p:spPr>
           <a:xfrm>
-            <a:off x="2781045" y="2901645"/>
+            <a:off x="5215000" y="3272485"/>
             <a:ext cx="3205480" cy="305104"/>
           </a:xfrm>
           <a:prstGeom prst="rect">
@@ -17658,7 +17476,7 @@
         </p:blipFill>
         <p:spPr>
           <a:xfrm>
-            <a:off x="2352801" y="3405251"/>
+            <a:off x="4786756" y="3776091"/>
             <a:ext cx="3645662" cy="304800"/>
           </a:xfrm>
           <a:prstGeom prst="rect">
@@ -17668,100 +17486,12 @@
       </p:pic>
       <p:pic>
         <p:nvPicPr>
-          <p:cNvPr id="7" name="object 7"/>
+          <p:cNvPr id="11" name="object 11"/>
           <p:cNvPicPr/>
           <p:nvPr/>
         </p:nvPicPr>
         <p:blipFill>
           <a:blip r:embed="rId5" cstate="print"/>
-          <a:stretch>
-            <a:fillRect/>
-          </a:stretch>
-        </p:blipFill>
-        <p:spPr>
-          <a:xfrm>
-            <a:off x="6333744" y="1762632"/>
-            <a:ext cx="3180842" cy="365760"/>
-          </a:xfrm>
-          <a:prstGeom prst="rect">
-            <a:avLst/>
-          </a:prstGeom>
-        </p:spPr>
-      </p:pic>
-      <p:pic>
-        <p:nvPicPr>
-          <p:cNvPr id="8" name="object 8"/>
-          <p:cNvPicPr/>
-          <p:nvPr/>
-        </p:nvPicPr>
-        <p:blipFill>
-          <a:blip r:embed="rId6" cstate="print"/>
-          <a:stretch>
-            <a:fillRect/>
-          </a:stretch>
-        </p:blipFill>
-        <p:spPr>
-          <a:xfrm>
-            <a:off x="6333744" y="2399029"/>
-            <a:ext cx="1890776" cy="304800"/>
-          </a:xfrm>
-          <a:prstGeom prst="rect">
-            <a:avLst/>
-          </a:prstGeom>
-        </p:spPr>
-      </p:pic>
-      <p:pic>
-        <p:nvPicPr>
-          <p:cNvPr id="9" name="object 9"/>
-          <p:cNvPicPr/>
-          <p:nvPr/>
-        </p:nvPicPr>
-        <p:blipFill>
-          <a:blip r:embed="rId7" cstate="print"/>
-          <a:stretch>
-            <a:fillRect/>
-          </a:stretch>
-        </p:blipFill>
-        <p:spPr>
-          <a:xfrm>
-            <a:off x="6333744" y="2901645"/>
-            <a:ext cx="2853817" cy="305104"/>
-          </a:xfrm>
-          <a:prstGeom prst="rect">
-            <a:avLst/>
-          </a:prstGeom>
-        </p:spPr>
-      </p:pic>
-      <p:pic>
-        <p:nvPicPr>
-          <p:cNvPr id="10" name="object 10"/>
-          <p:cNvPicPr/>
-          <p:nvPr/>
-        </p:nvPicPr>
-        <p:blipFill>
-          <a:blip r:embed="rId8" cstate="print"/>
-          <a:stretch>
-            <a:fillRect/>
-          </a:stretch>
-        </p:blipFill>
-        <p:spPr>
-          <a:xfrm>
-            <a:off x="6333744" y="3405251"/>
-            <a:ext cx="2631058" cy="304800"/>
-          </a:xfrm>
-          <a:prstGeom prst="rect">
-            <a:avLst/>
-          </a:prstGeom>
-        </p:spPr>
-      </p:pic>
-      <p:pic>
-        <p:nvPicPr>
-          <p:cNvPr id="11" name="object 11"/>
-          <p:cNvPicPr/>
-          <p:nvPr/>
-        </p:nvPicPr>
-        <p:blipFill>
-          <a:blip r:embed="rId9" cstate="print"/>
           <a:stretch>
             <a:fillRect/>
           </a:stretch>
@@ -18022,34 +17752,12 @@
       </p:sp>
       <p:pic>
         <p:nvPicPr>
-          <p:cNvPr id="8" name="object 8"/>
+          <p:cNvPr id="9" name="object 9"/>
           <p:cNvPicPr/>
           <p:nvPr/>
         </p:nvPicPr>
         <p:blipFill>
           <a:blip r:embed="rId5" cstate="print"/>
-          <a:stretch>
-            <a:fillRect/>
-          </a:stretch>
-        </p:blipFill>
-        <p:spPr>
-          <a:xfrm>
-            <a:off x="5624829" y="3453714"/>
-            <a:ext cx="3143757" cy="366064"/>
-          </a:xfrm>
-          <a:prstGeom prst="rect">
-            <a:avLst/>
-          </a:prstGeom>
-        </p:spPr>
-      </p:pic>
-      <p:pic>
-        <p:nvPicPr>
-          <p:cNvPr id="9" name="object 9"/>
-          <p:cNvPicPr/>
-          <p:nvPr/>
-        </p:nvPicPr>
-        <p:blipFill>
-          <a:blip r:embed="rId6" cstate="print"/>
           <a:stretch>
             <a:fillRect/>
           </a:stretch>
@@ -18058,28 +17766,6 @@
           <a:xfrm>
             <a:off x="5624829" y="3896233"/>
             <a:ext cx="4758055" cy="365760"/>
-          </a:xfrm>
-          <a:prstGeom prst="rect">
-            <a:avLst/>
-          </a:prstGeom>
-        </p:spPr>
-      </p:pic>
-      <p:pic>
-        <p:nvPicPr>
-          <p:cNvPr id="10" name="object 10"/>
-          <p:cNvPicPr/>
-          <p:nvPr/>
-        </p:nvPicPr>
-        <p:blipFill>
-          <a:blip r:embed="rId7" cstate="print"/>
-          <a:stretch>
-            <a:fillRect/>
-          </a:stretch>
-        </p:blipFill>
-        <p:spPr>
-          <a:xfrm>
-            <a:off x="5096002" y="4490669"/>
-            <a:ext cx="3886961" cy="366064"/>
           </a:xfrm>
           <a:prstGeom prst="rect">
             <a:avLst/>
@@ -18610,90 +18296,75 @@
           <a:chExt cx="0" cy="0"/>
         </a:xfrm>
       </p:grpSpPr>
-      <p:grpSp>
-        <p:nvGrpSpPr>
+      <p:pic>
+        <p:nvPicPr>
           <p:cNvPr id="2" name="object 2"/>
-          <p:cNvGrpSpPr/>
-          <p:nvPr/>
-        </p:nvGrpSpPr>
-        <p:grpSpPr>
+          <p:cNvPicPr/>
+          <p:nvPr/>
+        </p:nvPicPr>
+        <p:blipFill>
+          <a:blip r:embed="rId1" cstate="print"/>
+          <a:stretch>
+            <a:fillRect/>
+          </a:stretch>
+        </p:blipFill>
+        <p:spPr>
           <a:xfrm>
             <a:off x="0" y="0"/>
-            <a:ext cx="4636135" cy="6858000"/>
-            <a:chOff x="0" y="0"/>
-            <a:chExt cx="4636135" cy="6858000"/>
-          </a:xfrm>
-        </p:grpSpPr>
-        <p:pic>
-          <p:nvPicPr>
-            <p:cNvPr id="3" name="object 3"/>
-            <p:cNvPicPr/>
-            <p:nvPr/>
-          </p:nvPicPr>
-          <p:blipFill>
-            <a:blip r:embed="rId1" cstate="print"/>
-            <a:stretch>
-              <a:fillRect/>
-            </a:stretch>
-          </p:blipFill>
-          <p:spPr>
-            <a:xfrm>
-              <a:off x="0" y="0"/>
-              <a:ext cx="4636008" cy="6858000"/>
-            </a:xfrm>
-            <a:prstGeom prst="rect">
-              <a:avLst/>
-            </a:prstGeom>
-          </p:spPr>
-        </p:pic>
-        <p:pic>
-          <p:nvPicPr>
-            <p:cNvPr id="4" name="object 4"/>
-            <p:cNvPicPr/>
-            <p:nvPr/>
-          </p:nvPicPr>
-          <p:blipFill>
-            <a:blip r:embed="rId2" cstate="print"/>
-            <a:stretch>
-              <a:fillRect/>
-            </a:stretch>
-          </p:blipFill>
-          <p:spPr>
-            <a:xfrm>
-              <a:off x="1639189" y="1948560"/>
-              <a:ext cx="1689735" cy="548639"/>
-            </a:xfrm>
-            <a:prstGeom prst="rect">
-              <a:avLst/>
-            </a:prstGeom>
-          </p:spPr>
-        </p:pic>
-        <p:pic>
-          <p:nvPicPr>
-            <p:cNvPr id="5" name="object 5"/>
-            <p:cNvPicPr/>
-            <p:nvPr/>
-          </p:nvPicPr>
-          <p:blipFill>
-            <a:blip r:embed="rId3" cstate="print"/>
-            <a:stretch>
-              <a:fillRect/>
-            </a:stretch>
-          </p:blipFill>
-          <p:spPr>
-            <a:xfrm>
-              <a:off x="0" y="45719"/>
-              <a:ext cx="48463" cy="640333"/>
-            </a:xfrm>
-            <a:prstGeom prst="rect">
-              <a:avLst/>
-            </a:prstGeom>
-          </p:spPr>
-        </p:pic>
-      </p:grpSp>
-      <p:pic>
-        <p:nvPicPr>
-          <p:cNvPr id="6" name="object 6"/>
+            <a:ext cx="4636008" cy="6858000"/>
+          </a:xfrm>
+          <a:prstGeom prst="rect">
+            <a:avLst/>
+          </a:prstGeom>
+        </p:spPr>
+      </p:pic>
+      <p:pic>
+        <p:nvPicPr>
+          <p:cNvPr id="3" name="object 3"/>
+          <p:cNvPicPr/>
+          <p:nvPr/>
+        </p:nvPicPr>
+        <p:blipFill>
+          <a:blip r:embed="rId2" cstate="print"/>
+          <a:stretch>
+            <a:fillRect/>
+          </a:stretch>
+        </p:blipFill>
+        <p:spPr>
+          <a:xfrm>
+            <a:off x="5240146" y="2023872"/>
+            <a:ext cx="3257930" cy="365760"/>
+          </a:xfrm>
+          <a:prstGeom prst="rect">
+            <a:avLst/>
+          </a:prstGeom>
+        </p:spPr>
+      </p:pic>
+      <p:pic>
+        <p:nvPicPr>
+          <p:cNvPr id="4" name="object 4"/>
+          <p:cNvPicPr/>
+          <p:nvPr/>
+        </p:nvPicPr>
+        <p:blipFill>
+          <a:blip r:embed="rId3" cstate="print"/>
+          <a:stretch>
+            <a:fillRect/>
+          </a:stretch>
+        </p:blipFill>
+        <p:spPr>
+          <a:xfrm>
+            <a:off x="5240146" y="2618232"/>
+            <a:ext cx="4463796" cy="365760"/>
+          </a:xfrm>
+          <a:prstGeom prst="rect">
+            <a:avLst/>
+          </a:prstGeom>
+        </p:spPr>
+      </p:pic>
+      <p:pic>
+        <p:nvPicPr>
+          <p:cNvPr id="5" name="object 5"/>
           <p:cNvPicPr/>
           <p:nvPr/>
         </p:nvPicPr>
@@ -18705,74 +18376,8 @@
         </p:blipFill>
         <p:spPr>
           <a:xfrm>
-            <a:off x="5240146" y="694944"/>
-            <a:ext cx="4520564" cy="365760"/>
-          </a:xfrm>
-          <a:prstGeom prst="rect">
-            <a:avLst/>
-          </a:prstGeom>
-        </p:spPr>
-      </p:pic>
-      <p:pic>
-        <p:nvPicPr>
-          <p:cNvPr id="7" name="object 7"/>
-          <p:cNvPicPr/>
-          <p:nvPr/>
-        </p:nvPicPr>
-        <p:blipFill>
-          <a:blip r:embed="rId5" cstate="print"/>
-          <a:stretch>
-            <a:fillRect/>
-          </a:stretch>
-        </p:blipFill>
-        <p:spPr>
-          <a:xfrm>
-            <a:off x="5240146" y="1289303"/>
-            <a:ext cx="3180842" cy="365760"/>
-          </a:xfrm>
-          <a:prstGeom prst="rect">
-            <a:avLst/>
-          </a:prstGeom>
-        </p:spPr>
-      </p:pic>
-      <p:pic>
-        <p:nvPicPr>
-          <p:cNvPr id="8" name="object 8"/>
-          <p:cNvPicPr/>
-          <p:nvPr/>
-        </p:nvPicPr>
-        <p:blipFill>
-          <a:blip r:embed="rId6" cstate="print"/>
-          <a:stretch>
-            <a:fillRect/>
-          </a:stretch>
-        </p:blipFill>
-        <p:spPr>
-          <a:xfrm>
-            <a:off x="5240146" y="1883359"/>
-            <a:ext cx="3393058" cy="366064"/>
-          </a:xfrm>
-          <a:prstGeom prst="rect">
-            <a:avLst/>
-          </a:prstGeom>
-        </p:spPr>
-      </p:pic>
-      <p:pic>
-        <p:nvPicPr>
-          <p:cNvPr id="9" name="object 9"/>
-          <p:cNvPicPr/>
-          <p:nvPr/>
-        </p:nvPicPr>
-        <p:blipFill>
-          <a:blip r:embed="rId7" cstate="print"/>
-          <a:stretch>
-            <a:fillRect/>
-          </a:stretch>
-        </p:blipFill>
-        <p:spPr>
-          <a:xfrm>
-            <a:off x="5240146" y="2478277"/>
-            <a:ext cx="1366393" cy="365760"/>
+            <a:off x="5240146" y="3212845"/>
+            <a:ext cx="2429382" cy="365760"/>
           </a:xfrm>
           <a:prstGeom prst="rect">
             <a:avLst/>
@@ -18781,392 +18386,14 @@
       </p:pic>
       <p:sp>
         <p:nvSpPr>
-          <p:cNvPr id="10" name="object 10"/>
+          <p:cNvPr id="6" name="object 6"/>
           <p:cNvSpPr txBox="1"/>
           <p:nvPr/>
         </p:nvSpPr>
         <p:spPr>
           <a:xfrm>
-            <a:off x="5466715" y="2971546"/>
-            <a:ext cx="116839" cy="742315"/>
-          </a:xfrm>
-          <a:prstGeom prst="rect">
-            <a:avLst/>
-          </a:prstGeom>
-        </p:spPr>
-        <p:txBody>
-          <a:bodyPr vert="horz" wrap="square" lIns="0" tIns="12700" rIns="0" bIns="0" rtlCol="0">
-            <a:spAutoFit/>
-          </a:bodyPr>
-          <a:lstStyle/>
-          <a:p>
-            <a:pPr marL="12700">
-              <a:lnSpc>
-                <a:spcPct val="100000"/>
-              </a:lnSpc>
-              <a:spcBef>
-                <a:spcPts val="100"/>
-              </a:spcBef>
-            </a:pPr>
-            <a:r>
-              <a:rPr sz="1800" dirty="0">
-                <a:solidFill>
-                  <a:srgbClr val="2A9FBB"/>
-                </a:solidFill>
-                <a:latin typeface="Segoe UI" panose="020B0502040204020203"/>
-                <a:cs typeface="Segoe UI" panose="020B0502040204020203"/>
-              </a:rPr>
-              <a:t>-</a:t>
-            </a:r>
-            <a:endParaRPr sz="1800">
-              <a:latin typeface="Segoe UI" panose="020B0502040204020203"/>
-              <a:cs typeface="Segoe UI" panose="020B0502040204020203"/>
-            </a:endParaRPr>
-          </a:p>
-          <a:p>
-            <a:pPr marL="12700">
-              <a:lnSpc>
-                <a:spcPct val="100000"/>
-              </a:lnSpc>
-              <a:spcBef>
-                <a:spcPts val="1320"/>
-              </a:spcBef>
-            </a:pPr>
-            <a:r>
-              <a:rPr sz="1800" dirty="0">
-                <a:solidFill>
-                  <a:srgbClr val="2A9FBB"/>
-                </a:solidFill>
-                <a:latin typeface="Segoe UI" panose="020B0502040204020203"/>
-                <a:cs typeface="Segoe UI" panose="020B0502040204020203"/>
-              </a:rPr>
-              <a:t>-</a:t>
-            </a:r>
-            <a:endParaRPr sz="1800">
-              <a:latin typeface="Segoe UI" panose="020B0502040204020203"/>
-              <a:cs typeface="Segoe UI" panose="020B0502040204020203"/>
-            </a:endParaRPr>
-          </a:p>
-        </p:txBody>
-      </p:sp>
-      <p:pic>
-        <p:nvPicPr>
-          <p:cNvPr id="11" name="object 11"/>
-          <p:cNvPicPr/>
-          <p:nvPr/>
-        </p:nvPicPr>
-        <p:blipFill>
-          <a:blip r:embed="rId8" cstate="print"/>
-          <a:stretch>
-            <a:fillRect/>
-          </a:stretch>
-        </p:blipFill>
-        <p:spPr>
-          <a:xfrm>
-            <a:off x="5768975" y="2920314"/>
-            <a:ext cx="2004695" cy="366064"/>
-          </a:xfrm>
-          <a:prstGeom prst="rect">
-            <a:avLst/>
-          </a:prstGeom>
-        </p:spPr>
-      </p:pic>
-      <p:pic>
-        <p:nvPicPr>
-          <p:cNvPr id="12" name="object 12"/>
-          <p:cNvPicPr/>
-          <p:nvPr/>
-        </p:nvPicPr>
-        <p:blipFill>
-          <a:blip r:embed="rId9" cstate="print"/>
-          <a:stretch>
-            <a:fillRect/>
-          </a:stretch>
-        </p:blipFill>
-        <p:spPr>
-          <a:xfrm>
-            <a:off x="5768975" y="3362578"/>
-            <a:ext cx="841248" cy="365760"/>
-          </a:xfrm>
-          <a:prstGeom prst="rect">
-            <a:avLst/>
-          </a:prstGeom>
-        </p:spPr>
-      </p:pic>
-      <p:pic>
-        <p:nvPicPr>
-          <p:cNvPr id="13" name="object 13"/>
-          <p:cNvPicPr/>
-          <p:nvPr/>
-        </p:nvPicPr>
-        <p:blipFill>
-          <a:blip r:embed="rId10" cstate="print"/>
-          <a:stretch>
-            <a:fillRect/>
-          </a:stretch>
-        </p:blipFill>
-        <p:spPr>
-          <a:xfrm>
-            <a:off x="5240146" y="3956939"/>
-            <a:ext cx="5317235" cy="365760"/>
-          </a:xfrm>
-          <a:prstGeom prst="rect">
-            <a:avLst/>
-          </a:prstGeom>
-        </p:spPr>
-      </p:pic>
-      <p:sp>
-        <p:nvSpPr>
-          <p:cNvPr id="14" name="object 14"/>
-          <p:cNvSpPr txBox="1"/>
-          <p:nvPr/>
-        </p:nvSpPr>
-        <p:spPr>
-          <a:xfrm>
-            <a:off x="5466715" y="4450460"/>
+            <a:off x="5466715" y="3706114"/>
             <a:ext cx="116839" cy="299720"/>
-          </a:xfrm>
-          <a:prstGeom prst="rect">
-            <a:avLst/>
-          </a:prstGeom>
-        </p:spPr>
-        <p:txBody>
-          <a:bodyPr vert="horz" wrap="square" lIns="0" tIns="12700" rIns="0" bIns="0" rtlCol="0">
-            <a:spAutoFit/>
-          </a:bodyPr>
-          <a:lstStyle/>
-          <a:p>
-            <a:pPr marL="12700">
-              <a:lnSpc>
-                <a:spcPct val="100000"/>
-              </a:lnSpc>
-              <a:spcBef>
-                <a:spcPts val="100"/>
-              </a:spcBef>
-            </a:pPr>
-            <a:r>
-              <a:rPr sz="1800" dirty="0">
-                <a:solidFill>
-                  <a:srgbClr val="2A9FBB"/>
-                </a:solidFill>
-                <a:latin typeface="Segoe UI" panose="020B0502040204020203"/>
-                <a:cs typeface="Segoe UI" panose="020B0502040204020203"/>
-              </a:rPr>
-              <a:t>-</a:t>
-            </a:r>
-            <a:endParaRPr sz="1800">
-              <a:latin typeface="Segoe UI" panose="020B0502040204020203"/>
-              <a:cs typeface="Segoe UI" panose="020B0502040204020203"/>
-            </a:endParaRPr>
-          </a:p>
-        </p:txBody>
-      </p:sp>
-      <p:pic>
-        <p:nvPicPr>
-          <p:cNvPr id="15" name="object 15"/>
-          <p:cNvPicPr/>
-          <p:nvPr/>
-        </p:nvPicPr>
-        <p:blipFill>
-          <a:blip r:embed="rId11" cstate="print"/>
-          <a:stretch>
-            <a:fillRect/>
-          </a:stretch>
-        </p:blipFill>
-        <p:spPr>
-          <a:xfrm>
-            <a:off x="5768975" y="4399153"/>
-            <a:ext cx="3763899" cy="365760"/>
-          </a:xfrm>
-          <a:prstGeom prst="rect">
-            <a:avLst/>
-          </a:prstGeom>
-        </p:spPr>
-      </p:pic>
-      <p:pic>
-        <p:nvPicPr>
-          <p:cNvPr id="16" name="object 16"/>
-          <p:cNvPicPr/>
-          <p:nvPr/>
-        </p:nvPicPr>
-        <p:blipFill>
-          <a:blip r:embed="rId12" cstate="print"/>
-          <a:stretch>
-            <a:fillRect/>
-          </a:stretch>
-        </p:blipFill>
-        <p:spPr>
-          <a:xfrm>
-            <a:off x="5182234" y="4993513"/>
-            <a:ext cx="4236085" cy="365759"/>
-          </a:xfrm>
-          <a:prstGeom prst="rect">
-            <a:avLst/>
-          </a:prstGeom>
-        </p:spPr>
-      </p:pic>
-      <p:pic>
-        <p:nvPicPr>
-          <p:cNvPr id="17" name="object 17"/>
-          <p:cNvPicPr/>
-          <p:nvPr/>
-        </p:nvPicPr>
-        <p:blipFill>
-          <a:blip r:embed="rId13" cstate="print"/>
-          <a:stretch>
-            <a:fillRect/>
-          </a:stretch>
-        </p:blipFill>
-        <p:spPr>
-          <a:xfrm>
-            <a:off x="5182234" y="5587593"/>
-            <a:ext cx="4740655" cy="366064"/>
-          </a:xfrm>
-          <a:prstGeom prst="rect">
-            <a:avLst/>
-          </a:prstGeom>
-        </p:spPr>
-      </p:pic>
-      <p:sp>
-        <p:nvSpPr>
-          <p:cNvPr id="18" name="Slide Number Placeholder 17"/>
-          <p:cNvSpPr>
-            <a:spLocks noGrp="1"/>
-          </p:cNvSpPr>
-          <p:nvPr>
-            <p:ph type="sldNum" sz="quarter" idx="7"/>
-          </p:nvPr>
-        </p:nvSpPr>
-        <p:spPr/>
-        <p:txBody>
-          <a:bodyPr/>
-          <a:p>
-            <a:fld id="{B6F15528-21DE-4FAA-801E-634DDDAF4B2B}" type="slidenum">
-              <a:rPr/>
-            </a:fld>
-            <a:endParaRPr/>
-          </a:p>
-        </p:txBody>
-      </p:sp>
-    </p:spTree>
-  </p:cSld>
-  <p:clrMapOvr>
-    <a:masterClrMapping/>
-  </p:clrMapOvr>
-</p:sld>
-</file>
-
-<file path=ppt/slides/slide29.xml><?xml version="1.0" encoding="utf-8"?>
-<p:sld xmlns:a="http://schemas.openxmlformats.org/drawingml/2006/main" xmlns:r="http://schemas.openxmlformats.org/officeDocument/2006/relationships" xmlns:p="http://schemas.openxmlformats.org/presentationml/2006/main">
-  <p:cSld>
-    <p:spTree>
-      <p:nvGrpSpPr>
-        <p:cNvPr id="1" name=""/>
-        <p:cNvGrpSpPr/>
-        <p:nvPr/>
-      </p:nvGrpSpPr>
-      <p:grpSpPr>
-        <a:xfrm>
-          <a:off x="0" y="0"/>
-          <a:ext cx="0" cy="0"/>
-          <a:chOff x="0" y="0"/>
-          <a:chExt cx="0" cy="0"/>
-        </a:xfrm>
-      </p:grpSpPr>
-      <p:sp>
-        <p:nvSpPr>
-          <p:cNvPr id="2" name="object 2"/>
-          <p:cNvSpPr/>
-          <p:nvPr/>
-        </p:nvSpPr>
-        <p:spPr>
-          <a:xfrm>
-            <a:off x="4584953" y="1572005"/>
-            <a:ext cx="0" cy="4131310"/>
-          </a:xfrm>
-          <a:custGeom>
-            <a:avLst/>
-            <a:gdLst/>
-            <a:ahLst/>
-            <a:cxnLst/>
-            <a:rect l="l" t="t" r="r" b="b"/>
-            <a:pathLst>
-              <a:path h="4131310">
-                <a:moveTo>
-                  <a:pt x="0" y="0"/>
-                </a:moveTo>
-                <a:lnTo>
-                  <a:pt x="0" y="4130941"/>
-                </a:lnTo>
-              </a:path>
-            </a:pathLst>
-          </a:custGeom>
-          <a:ln w="25908">
-            <a:solidFill>
-              <a:srgbClr val="EF5A28"/>
-            </a:solidFill>
-          </a:ln>
-        </p:spPr>
-        <p:txBody>
-          <a:bodyPr wrap="square" lIns="0" tIns="0" rIns="0" bIns="0" rtlCol="0"/>
-          <a:lstStyle/>
-          <a:p/>
-        </p:txBody>
-      </p:sp>
-      <p:pic>
-        <p:nvPicPr>
-          <p:cNvPr id="3" name="object 3"/>
-          <p:cNvPicPr/>
-          <p:nvPr/>
-        </p:nvPicPr>
-        <p:blipFill>
-          <a:blip r:embed="rId1" cstate="print"/>
-          <a:stretch>
-            <a:fillRect/>
-          </a:stretch>
-        </p:blipFill>
-        <p:spPr>
-          <a:xfrm>
-            <a:off x="2644139" y="544652"/>
-            <a:ext cx="7079996" cy="548944"/>
-          </a:xfrm>
-          <a:prstGeom prst="rect">
-            <a:avLst/>
-          </a:prstGeom>
-        </p:spPr>
-      </p:pic>
-      <p:pic>
-        <p:nvPicPr>
-          <p:cNvPr id="4" name="object 4"/>
-          <p:cNvPicPr/>
-          <p:nvPr/>
-        </p:nvPicPr>
-        <p:blipFill>
-          <a:blip r:embed="rId2" cstate="print"/>
-          <a:stretch>
-            <a:fillRect/>
-          </a:stretch>
-        </p:blipFill>
-        <p:spPr>
-          <a:xfrm>
-            <a:off x="5096002" y="1571497"/>
-            <a:ext cx="3394582" cy="365760"/>
-          </a:xfrm>
-          <a:prstGeom prst="rect">
-            <a:avLst/>
-          </a:prstGeom>
-        </p:spPr>
-      </p:pic>
-      <p:sp>
-        <p:nvSpPr>
-          <p:cNvPr id="5" name="object 5"/>
-          <p:cNvSpPr txBox="1"/>
-          <p:nvPr/>
-        </p:nvSpPr>
-        <p:spPr>
-          <a:xfrm>
-            <a:off x="5322570" y="2064765"/>
-            <a:ext cx="117475" cy="2068195"/>
           </a:xfrm>
           <a:prstGeom prst="rect">
             <a:avLst/>
@@ -19201,210 +18428,55 @@
               <a:cs typeface="Segoe UI" panose="020B0502040204020203"/>
             </a:endParaRPr>
           </a:p>
-          <a:p>
-            <a:pPr marL="12700">
-              <a:lnSpc>
-                <a:spcPct val="100000"/>
-              </a:lnSpc>
-              <a:spcBef>
-                <a:spcPts val="1320"/>
-              </a:spcBef>
-            </a:pPr>
-            <a:r>
-              <a:rPr sz="1800" dirty="0">
-                <a:solidFill>
-                  <a:srgbClr val="EF5A28"/>
-                </a:solidFill>
-                <a:latin typeface="Segoe UI" panose="020B0502040204020203"/>
-                <a:cs typeface="Segoe UI" panose="020B0502040204020203"/>
-              </a:rPr>
-              <a:t>-</a:t>
-            </a:r>
-            <a:endParaRPr sz="1800">
-              <a:latin typeface="Segoe UI" panose="020B0502040204020203"/>
-              <a:cs typeface="Segoe UI" panose="020B0502040204020203"/>
-            </a:endParaRPr>
-          </a:p>
-          <a:p>
-            <a:pPr marL="12700">
-              <a:lnSpc>
-                <a:spcPct val="100000"/>
-              </a:lnSpc>
-              <a:spcBef>
-                <a:spcPts val="1320"/>
-              </a:spcBef>
-            </a:pPr>
-            <a:r>
-              <a:rPr sz="1800" dirty="0">
-                <a:solidFill>
-                  <a:srgbClr val="EF5A28"/>
-                </a:solidFill>
-                <a:latin typeface="Segoe UI" panose="020B0502040204020203"/>
-                <a:cs typeface="Segoe UI" panose="020B0502040204020203"/>
-              </a:rPr>
-              <a:t>-</a:t>
-            </a:r>
-            <a:endParaRPr sz="1800">
-              <a:latin typeface="Segoe UI" panose="020B0502040204020203"/>
-              <a:cs typeface="Segoe UI" panose="020B0502040204020203"/>
-            </a:endParaRPr>
-          </a:p>
-          <a:p>
-            <a:pPr marL="12700">
-              <a:lnSpc>
-                <a:spcPct val="100000"/>
-              </a:lnSpc>
-              <a:spcBef>
-                <a:spcPts val="1320"/>
-              </a:spcBef>
-            </a:pPr>
-            <a:r>
-              <a:rPr sz="1800" dirty="0">
-                <a:solidFill>
-                  <a:srgbClr val="EF5A28"/>
-                </a:solidFill>
-                <a:latin typeface="Segoe UI" panose="020B0502040204020203"/>
-                <a:cs typeface="Segoe UI" panose="020B0502040204020203"/>
-              </a:rPr>
-              <a:t>-</a:t>
-            </a:r>
-            <a:endParaRPr sz="1800">
-              <a:latin typeface="Segoe UI" panose="020B0502040204020203"/>
-              <a:cs typeface="Segoe UI" panose="020B0502040204020203"/>
-            </a:endParaRPr>
-          </a:p>
-          <a:p>
-            <a:pPr marL="12700">
-              <a:lnSpc>
-                <a:spcPct val="100000"/>
-              </a:lnSpc>
-              <a:spcBef>
-                <a:spcPts val="1325"/>
-              </a:spcBef>
-            </a:pPr>
-            <a:r>
-              <a:rPr sz="1800" dirty="0">
-                <a:solidFill>
-                  <a:srgbClr val="EF5A28"/>
-                </a:solidFill>
-                <a:latin typeface="Segoe UI" panose="020B0502040204020203"/>
-                <a:cs typeface="Segoe UI" panose="020B0502040204020203"/>
-              </a:rPr>
-              <a:t>-</a:t>
-            </a:r>
-            <a:endParaRPr sz="1800">
-              <a:latin typeface="Segoe UI" panose="020B0502040204020203"/>
-              <a:cs typeface="Segoe UI" panose="020B0502040204020203"/>
-            </a:endParaRPr>
-          </a:p>
         </p:txBody>
       </p:sp>
       <p:pic>
         <p:nvPicPr>
-          <p:cNvPr id="6" name="object 6"/>
-          <p:cNvPicPr/>
-          <p:nvPr/>
-        </p:nvPicPr>
-        <p:blipFill>
-          <a:blip r:embed="rId3" cstate="print"/>
-          <a:stretch>
-            <a:fillRect/>
-          </a:stretch>
-        </p:blipFill>
-        <p:spPr>
-          <a:xfrm>
-            <a:off x="5624829" y="2013534"/>
-            <a:ext cx="2037714" cy="366064"/>
-          </a:xfrm>
-          <a:prstGeom prst="rect">
-            <a:avLst/>
-          </a:prstGeom>
-        </p:spPr>
-      </p:pic>
-      <p:grpSp>
-        <p:nvGrpSpPr>
           <p:cNvPr id="7" name="object 7"/>
-          <p:cNvGrpSpPr/>
-          <p:nvPr/>
-        </p:nvGrpSpPr>
-        <p:grpSpPr>
-          <a:xfrm>
-            <a:off x="5624829" y="2455798"/>
-            <a:ext cx="2858770" cy="365760"/>
-            <a:chOff x="5624829" y="2455798"/>
-            <a:chExt cx="2858770" cy="365760"/>
-          </a:xfrm>
-        </p:grpSpPr>
-        <p:pic>
-          <p:nvPicPr>
-            <p:cNvPr id="8" name="object 8"/>
-            <p:cNvPicPr/>
-            <p:nvPr/>
-          </p:nvPicPr>
-          <p:blipFill>
-            <a:blip r:embed="rId4" cstate="print"/>
-            <a:stretch>
-              <a:fillRect/>
-            </a:stretch>
-          </p:blipFill>
-          <p:spPr>
-            <a:xfrm>
-              <a:off x="5624829" y="2455798"/>
-              <a:ext cx="1779016" cy="365760"/>
-            </a:xfrm>
-            <a:prstGeom prst="rect">
-              <a:avLst/>
-            </a:prstGeom>
-          </p:spPr>
-        </p:pic>
-        <p:pic>
-          <p:nvPicPr>
-            <p:cNvPr id="9" name="object 9"/>
-            <p:cNvPicPr/>
-            <p:nvPr/>
-          </p:nvPicPr>
-          <p:blipFill>
-            <a:blip r:embed="rId5" cstate="print"/>
-            <a:stretch>
-              <a:fillRect/>
-            </a:stretch>
-          </p:blipFill>
-          <p:spPr>
-            <a:xfrm>
-              <a:off x="7242047" y="2455798"/>
-              <a:ext cx="295655" cy="365760"/>
-            </a:xfrm>
-            <a:prstGeom prst="rect">
-              <a:avLst/>
-            </a:prstGeom>
-          </p:spPr>
-        </p:pic>
-        <p:pic>
-          <p:nvPicPr>
-            <p:cNvPr id="10" name="object 10"/>
-            <p:cNvPicPr/>
-            <p:nvPr/>
-          </p:nvPicPr>
-          <p:blipFill>
-            <a:blip r:embed="rId6" cstate="print"/>
-            <a:stretch>
-              <a:fillRect/>
-            </a:stretch>
-          </p:blipFill>
-          <p:spPr>
-            <a:xfrm>
-              <a:off x="7389875" y="2455798"/>
-              <a:ext cx="1093622" cy="365760"/>
-            </a:xfrm>
-            <a:prstGeom prst="rect">
-              <a:avLst/>
-            </a:prstGeom>
-          </p:spPr>
-        </p:pic>
-      </p:grpSp>
-      <p:pic>
-        <p:nvPicPr>
-          <p:cNvPr id="11" name="object 11"/>
+          <p:cNvPicPr/>
+          <p:nvPr/>
+        </p:nvPicPr>
+        <p:blipFill>
+          <a:blip r:embed="rId5" cstate="print"/>
+          <a:stretch>
+            <a:fillRect/>
+          </a:stretch>
+        </p:blipFill>
+        <p:spPr>
+          <a:xfrm>
+            <a:off x="5768975" y="3654805"/>
+            <a:ext cx="3311398" cy="365760"/>
+          </a:xfrm>
+          <a:prstGeom prst="rect">
+            <a:avLst/>
+          </a:prstGeom>
+        </p:spPr>
+      </p:pic>
+      <p:pic>
+        <p:nvPicPr>
+          <p:cNvPr id="8" name="object 8"/>
+          <p:cNvPicPr/>
+          <p:nvPr/>
+        </p:nvPicPr>
+        <p:blipFill>
+          <a:blip r:embed="rId6" cstate="print"/>
+          <a:stretch>
+            <a:fillRect/>
+          </a:stretch>
+        </p:blipFill>
+        <p:spPr>
+          <a:xfrm>
+            <a:off x="5240146" y="4248861"/>
+            <a:ext cx="4869941" cy="366064"/>
+          </a:xfrm>
+          <a:prstGeom prst="rect">
+            <a:avLst/>
+          </a:prstGeom>
+        </p:spPr>
+      </p:pic>
+      <p:pic>
+        <p:nvPicPr>
+          <p:cNvPr id="15" name="object 15"/>
           <p:cNvPicPr/>
           <p:nvPr/>
         </p:nvPicPr>
@@ -19416,133 +18488,8 @@
         </p:blipFill>
         <p:spPr>
           <a:xfrm>
-            <a:off x="5624829" y="2897758"/>
-            <a:ext cx="3154933" cy="365760"/>
-          </a:xfrm>
-          <a:prstGeom prst="rect">
-            <a:avLst/>
-          </a:prstGeom>
-        </p:spPr>
-      </p:pic>
-      <p:pic>
-        <p:nvPicPr>
-          <p:cNvPr id="12" name="object 12"/>
-          <p:cNvPicPr/>
-          <p:nvPr/>
-        </p:nvPicPr>
-        <p:blipFill>
-          <a:blip r:embed="rId8" cstate="print"/>
-          <a:stretch>
-            <a:fillRect/>
-          </a:stretch>
-        </p:blipFill>
-        <p:spPr>
-          <a:xfrm>
-            <a:off x="5624829" y="3339414"/>
-            <a:ext cx="1214323" cy="366064"/>
-          </a:xfrm>
-          <a:prstGeom prst="rect">
-            <a:avLst/>
-          </a:prstGeom>
-        </p:spPr>
-      </p:pic>
-      <p:pic>
-        <p:nvPicPr>
-          <p:cNvPr id="13" name="object 13"/>
-          <p:cNvPicPr/>
-          <p:nvPr/>
-        </p:nvPicPr>
-        <p:blipFill>
-          <a:blip r:embed="rId9" cstate="print"/>
-          <a:stretch>
-            <a:fillRect/>
-          </a:stretch>
-        </p:blipFill>
-        <p:spPr>
-          <a:xfrm>
-            <a:off x="5624829" y="3781933"/>
-            <a:ext cx="3675633" cy="365760"/>
-          </a:xfrm>
-          <a:prstGeom prst="rect">
-            <a:avLst/>
-          </a:prstGeom>
-        </p:spPr>
-      </p:pic>
-      <p:grpSp>
-        <p:nvGrpSpPr>
-          <p:cNvPr id="14" name="object 14"/>
-          <p:cNvGrpSpPr/>
-          <p:nvPr/>
-        </p:nvGrpSpPr>
-        <p:grpSpPr>
-          <a:xfrm>
-            <a:off x="5038090" y="4376292"/>
-            <a:ext cx="5741670" cy="732155"/>
-            <a:chOff x="5038090" y="4376292"/>
-            <a:chExt cx="5741670" cy="732155"/>
-          </a:xfrm>
-        </p:grpSpPr>
-        <p:pic>
-          <p:nvPicPr>
-            <p:cNvPr id="15" name="object 15"/>
-            <p:cNvPicPr/>
-            <p:nvPr/>
-          </p:nvPicPr>
-          <p:blipFill>
-            <a:blip r:embed="rId10" cstate="print"/>
-            <a:stretch>
-              <a:fillRect/>
-            </a:stretch>
-          </p:blipFill>
-          <p:spPr>
-            <a:xfrm>
-              <a:off x="5038090" y="4376292"/>
-              <a:ext cx="5741289" cy="365760"/>
-            </a:xfrm>
-            <a:prstGeom prst="rect">
-              <a:avLst/>
-            </a:prstGeom>
-          </p:spPr>
-        </p:pic>
-        <p:pic>
-          <p:nvPicPr>
-            <p:cNvPr id="16" name="object 16"/>
-            <p:cNvPicPr/>
-            <p:nvPr/>
-          </p:nvPicPr>
-          <p:blipFill>
-            <a:blip r:embed="rId11" cstate="print"/>
-            <a:stretch>
-              <a:fillRect/>
-            </a:stretch>
-          </p:blipFill>
-          <p:spPr>
-            <a:xfrm>
-              <a:off x="5038090" y="4742433"/>
-              <a:ext cx="1456055" cy="365760"/>
-            </a:xfrm>
-            <a:prstGeom prst="rect">
-              <a:avLst/>
-            </a:prstGeom>
-          </p:spPr>
-        </p:pic>
-      </p:grpSp>
-      <p:pic>
-        <p:nvPicPr>
-          <p:cNvPr id="17" name="object 17"/>
-          <p:cNvPicPr/>
-          <p:nvPr/>
-        </p:nvPicPr>
-        <p:blipFill>
-          <a:blip r:embed="rId12" cstate="print"/>
-          <a:stretch>
-            <a:fillRect/>
-          </a:stretch>
-        </p:blipFill>
-        <p:spPr>
-          <a:xfrm>
-            <a:off x="1411147" y="2801081"/>
-            <a:ext cx="1686687" cy="1670364"/>
+            <a:off x="1239926" y="1947621"/>
+            <a:ext cx="2463165" cy="548944"/>
           </a:xfrm>
           <a:prstGeom prst="rect">
             <a:avLst/>
@@ -19551,7 +18498,7 @@
       </p:pic>
       <p:sp>
         <p:nvSpPr>
-          <p:cNvPr id="18" name="Slide Number Placeholder 17"/>
+          <p:cNvPr id="16" name="Slide Number Placeholder 15"/>
           <p:cNvSpPr>
             <a:spLocks noGrp="1"/>
           </p:cNvSpPr>
@@ -19861,1787 +18808,9 @@
           </a:prstGeom>
         </p:spPr>
       </p:pic>
-      <p:pic>
-        <p:nvPicPr>
-          <p:cNvPr id="10" name="object 10"/>
-          <p:cNvPicPr/>
-          <p:nvPr/>
-        </p:nvPicPr>
-        <p:blipFill>
-          <a:blip r:embed="rId7" cstate="print"/>
-          <a:stretch>
-            <a:fillRect/>
-          </a:stretch>
-        </p:blipFill>
-        <p:spPr>
-          <a:xfrm>
-            <a:off x="5624829" y="4414392"/>
-            <a:ext cx="4223258" cy="365760"/>
-          </a:xfrm>
-          <a:prstGeom prst="rect">
-            <a:avLst/>
-          </a:prstGeom>
-        </p:spPr>
-      </p:pic>
       <p:sp>
         <p:nvSpPr>
           <p:cNvPr id="11" name="Slide Number Placeholder 10"/>
-          <p:cNvSpPr>
-            <a:spLocks noGrp="1"/>
-          </p:cNvSpPr>
-          <p:nvPr>
-            <p:ph type="sldNum" sz="quarter" idx="7"/>
-          </p:nvPr>
-        </p:nvSpPr>
-        <p:spPr/>
-        <p:txBody>
-          <a:bodyPr/>
-          <a:p>
-            <a:fld id="{B6F15528-21DE-4FAA-801E-634DDDAF4B2B}" type="slidenum">
-              <a:rPr/>
-            </a:fld>
-            <a:endParaRPr/>
-          </a:p>
-        </p:txBody>
-      </p:sp>
-    </p:spTree>
-  </p:cSld>
-  <p:clrMapOvr>
-    <a:masterClrMapping/>
-  </p:clrMapOvr>
-</p:sld>
-</file>
-
-<file path=ppt/slides/slide30.xml><?xml version="1.0" encoding="utf-8"?>
-<p:sld xmlns:a="http://schemas.openxmlformats.org/drawingml/2006/main" xmlns:r="http://schemas.openxmlformats.org/officeDocument/2006/relationships" xmlns:p="http://schemas.openxmlformats.org/presentationml/2006/main">
-  <p:cSld>
-    <p:spTree>
-      <p:nvGrpSpPr>
-        <p:cNvPr id="1" name=""/>
-        <p:cNvGrpSpPr/>
-        <p:nvPr/>
-      </p:nvGrpSpPr>
-      <p:grpSpPr>
-        <a:xfrm>
-          <a:off x="0" y="0"/>
-          <a:ext cx="0" cy="0"/>
-          <a:chOff x="0" y="0"/>
-          <a:chExt cx="0" cy="0"/>
-        </a:xfrm>
-      </p:grpSpPr>
-      <p:grpSp>
-        <p:nvGrpSpPr>
-          <p:cNvPr id="2" name="object 2"/>
-          <p:cNvGrpSpPr/>
-          <p:nvPr/>
-        </p:nvGrpSpPr>
-        <p:grpSpPr>
-          <a:xfrm>
-            <a:off x="0" y="0"/>
-            <a:ext cx="4636135" cy="6858000"/>
-            <a:chOff x="0" y="0"/>
-            <a:chExt cx="4636135" cy="6858000"/>
-          </a:xfrm>
-        </p:grpSpPr>
-        <p:pic>
-          <p:nvPicPr>
-            <p:cNvPr id="3" name="object 3"/>
-            <p:cNvPicPr/>
-            <p:nvPr/>
-          </p:nvPicPr>
-          <p:blipFill>
-            <a:blip r:embed="rId1" cstate="print"/>
-            <a:stretch>
-              <a:fillRect/>
-            </a:stretch>
-          </p:blipFill>
-          <p:spPr>
-            <a:xfrm>
-              <a:off x="0" y="0"/>
-              <a:ext cx="4636008" cy="6858000"/>
-            </a:xfrm>
-            <a:prstGeom prst="rect">
-              <a:avLst/>
-            </a:prstGeom>
-          </p:spPr>
-        </p:pic>
-        <p:pic>
-          <p:nvPicPr>
-            <p:cNvPr id="4" name="object 4"/>
-            <p:cNvPicPr/>
-            <p:nvPr/>
-          </p:nvPicPr>
-          <p:blipFill>
-            <a:blip r:embed="rId2" cstate="print"/>
-            <a:stretch>
-              <a:fillRect/>
-            </a:stretch>
-          </p:blipFill>
-          <p:spPr>
-            <a:xfrm>
-              <a:off x="1639189" y="1948560"/>
-              <a:ext cx="1689735" cy="548639"/>
-            </a:xfrm>
-            <a:prstGeom prst="rect">
-              <a:avLst/>
-            </a:prstGeom>
-          </p:spPr>
-        </p:pic>
-        <p:pic>
-          <p:nvPicPr>
-            <p:cNvPr id="5" name="object 5"/>
-            <p:cNvPicPr/>
-            <p:nvPr/>
-          </p:nvPicPr>
-          <p:blipFill>
-            <a:blip r:embed="rId3" cstate="print"/>
-            <a:stretch>
-              <a:fillRect/>
-            </a:stretch>
-          </p:blipFill>
-          <p:spPr>
-            <a:xfrm>
-              <a:off x="0" y="45719"/>
-              <a:ext cx="48463" cy="640333"/>
-            </a:xfrm>
-            <a:prstGeom prst="rect">
-              <a:avLst/>
-            </a:prstGeom>
-          </p:spPr>
-        </p:pic>
-      </p:grpSp>
-      <p:pic>
-        <p:nvPicPr>
-          <p:cNvPr id="6" name="object 6"/>
-          <p:cNvPicPr/>
-          <p:nvPr/>
-        </p:nvPicPr>
-        <p:blipFill>
-          <a:blip r:embed="rId4" cstate="print"/>
-          <a:stretch>
-            <a:fillRect/>
-          </a:stretch>
-        </p:blipFill>
-        <p:spPr>
-          <a:xfrm>
-            <a:off x="5240146" y="2546857"/>
-            <a:ext cx="3948429" cy="365760"/>
-          </a:xfrm>
-          <a:prstGeom prst="rect">
-            <a:avLst/>
-          </a:prstGeom>
-        </p:spPr>
-      </p:pic>
-      <p:pic>
-        <p:nvPicPr>
-          <p:cNvPr id="7" name="object 7"/>
-          <p:cNvPicPr/>
-          <p:nvPr/>
-        </p:nvPicPr>
-        <p:blipFill>
-          <a:blip r:embed="rId5" cstate="print"/>
-          <a:stretch>
-            <a:fillRect/>
-          </a:stretch>
-        </p:blipFill>
-        <p:spPr>
-          <a:xfrm>
-            <a:off x="5240146" y="3140913"/>
-            <a:ext cx="3217672" cy="366064"/>
-          </a:xfrm>
-          <a:prstGeom prst="rect">
-            <a:avLst/>
-          </a:prstGeom>
-        </p:spPr>
-      </p:pic>
-      <p:pic>
-        <p:nvPicPr>
-          <p:cNvPr id="8" name="object 8"/>
-          <p:cNvPicPr/>
-          <p:nvPr/>
-        </p:nvPicPr>
-        <p:blipFill>
-          <a:blip r:embed="rId6" cstate="print"/>
-          <a:stretch>
-            <a:fillRect/>
-          </a:stretch>
-        </p:blipFill>
-        <p:spPr>
-          <a:xfrm>
-            <a:off x="5240146" y="3735959"/>
-            <a:ext cx="2747645" cy="365760"/>
-          </a:xfrm>
-          <a:prstGeom prst="rect">
-            <a:avLst/>
-          </a:prstGeom>
-        </p:spPr>
-      </p:pic>
-      <p:sp>
-        <p:nvSpPr>
-          <p:cNvPr id="9" name="Slide Number Placeholder 8"/>
-          <p:cNvSpPr>
-            <a:spLocks noGrp="1"/>
-          </p:cNvSpPr>
-          <p:nvPr>
-            <p:ph type="sldNum" sz="quarter" idx="7"/>
-          </p:nvPr>
-        </p:nvSpPr>
-        <p:spPr/>
-        <p:txBody>
-          <a:bodyPr/>
-          <a:p>
-            <a:fld id="{B6F15528-21DE-4FAA-801E-634DDDAF4B2B}" type="slidenum">
-              <a:rPr/>
-            </a:fld>
-            <a:endParaRPr/>
-          </a:p>
-        </p:txBody>
-      </p:sp>
-    </p:spTree>
-  </p:cSld>
-  <p:clrMapOvr>
-    <a:masterClrMapping/>
-  </p:clrMapOvr>
-</p:sld>
-</file>
-
-<file path=ppt/slides/slide31.xml><?xml version="1.0" encoding="utf-8"?>
-<p:sld xmlns:a="http://schemas.openxmlformats.org/drawingml/2006/main" xmlns:r="http://schemas.openxmlformats.org/officeDocument/2006/relationships" xmlns:p="http://schemas.openxmlformats.org/presentationml/2006/main">
-  <p:cSld>
-    <p:spTree>
-      <p:nvGrpSpPr>
-        <p:cNvPr id="1" name=""/>
-        <p:cNvGrpSpPr/>
-        <p:nvPr/>
-      </p:nvGrpSpPr>
-      <p:grpSpPr>
-        <a:xfrm>
-          <a:off x="0" y="0"/>
-          <a:ext cx="0" cy="0"/>
-          <a:chOff x="0" y="0"/>
-          <a:chExt cx="0" cy="0"/>
-        </a:xfrm>
-      </p:grpSpPr>
-      <p:sp>
-        <p:nvSpPr>
-          <p:cNvPr id="2" name="object 2"/>
-          <p:cNvSpPr/>
-          <p:nvPr/>
-        </p:nvSpPr>
-        <p:spPr>
-          <a:xfrm>
-            <a:off x="4584953" y="1572005"/>
-            <a:ext cx="0" cy="4131310"/>
-          </a:xfrm>
-          <a:custGeom>
-            <a:avLst/>
-            <a:gdLst/>
-            <a:ahLst/>
-            <a:cxnLst/>
-            <a:rect l="l" t="t" r="r" b="b"/>
-            <a:pathLst>
-              <a:path h="4131310">
-                <a:moveTo>
-                  <a:pt x="0" y="0"/>
-                </a:moveTo>
-                <a:lnTo>
-                  <a:pt x="0" y="4130941"/>
-                </a:lnTo>
-              </a:path>
-            </a:pathLst>
-          </a:custGeom>
-          <a:ln w="25908">
-            <a:solidFill>
-              <a:srgbClr val="EF5A28"/>
-            </a:solidFill>
-          </a:ln>
-        </p:spPr>
-        <p:txBody>
-          <a:bodyPr wrap="square" lIns="0" tIns="0" rIns="0" bIns="0" rtlCol="0"/>
-          <a:lstStyle/>
-          <a:p/>
-        </p:txBody>
-      </p:sp>
-      <p:pic>
-        <p:nvPicPr>
-          <p:cNvPr id="3" name="object 3"/>
-          <p:cNvPicPr/>
-          <p:nvPr/>
-        </p:nvPicPr>
-        <p:blipFill>
-          <a:blip r:embed="rId1" cstate="print"/>
-          <a:stretch>
-            <a:fillRect/>
-          </a:stretch>
-        </p:blipFill>
-        <p:spPr>
-          <a:xfrm>
-            <a:off x="4031234" y="544652"/>
-            <a:ext cx="4279773" cy="548944"/>
-          </a:xfrm>
-          <a:prstGeom prst="rect">
-            <a:avLst/>
-          </a:prstGeom>
-        </p:spPr>
-      </p:pic>
-      <p:grpSp>
-        <p:nvGrpSpPr>
-          <p:cNvPr id="4" name="object 4"/>
-          <p:cNvGrpSpPr/>
-          <p:nvPr/>
-        </p:nvGrpSpPr>
-        <p:grpSpPr>
-          <a:xfrm>
-            <a:off x="5038090" y="2859658"/>
-            <a:ext cx="2977515" cy="365760"/>
-            <a:chOff x="5038090" y="2859658"/>
-            <a:chExt cx="2977515" cy="365760"/>
-          </a:xfrm>
-        </p:grpSpPr>
-        <p:pic>
-          <p:nvPicPr>
-            <p:cNvPr id="5" name="object 5"/>
-            <p:cNvPicPr/>
-            <p:nvPr/>
-          </p:nvPicPr>
-          <p:blipFill>
-            <a:blip r:embed="rId2" cstate="print"/>
-            <a:stretch>
-              <a:fillRect/>
-            </a:stretch>
-          </p:blipFill>
-          <p:spPr>
-            <a:xfrm>
-              <a:off x="5038090" y="2859658"/>
-              <a:ext cx="1683131" cy="365760"/>
-            </a:xfrm>
-            <a:prstGeom prst="rect">
-              <a:avLst/>
-            </a:prstGeom>
-          </p:spPr>
-        </p:pic>
-        <p:pic>
-          <p:nvPicPr>
-            <p:cNvPr id="6" name="object 6"/>
-            <p:cNvPicPr/>
-            <p:nvPr/>
-          </p:nvPicPr>
-          <p:blipFill>
-            <a:blip r:embed="rId3" cstate="print"/>
-            <a:stretch>
-              <a:fillRect/>
-            </a:stretch>
-          </p:blipFill>
-          <p:spPr>
-            <a:xfrm>
-              <a:off x="6568186" y="2859658"/>
-              <a:ext cx="739521" cy="365760"/>
-            </a:xfrm>
-            <a:prstGeom prst="rect">
-              <a:avLst/>
-            </a:prstGeom>
-          </p:spPr>
-        </p:pic>
-        <p:pic>
-          <p:nvPicPr>
-            <p:cNvPr id="7" name="object 7"/>
-            <p:cNvPicPr/>
-            <p:nvPr/>
-          </p:nvPicPr>
-          <p:blipFill>
-            <a:blip r:embed="rId4" cstate="print"/>
-            <a:stretch>
-              <a:fillRect/>
-            </a:stretch>
-          </p:blipFill>
-          <p:spPr>
-            <a:xfrm>
-              <a:off x="7159752" y="2859658"/>
-              <a:ext cx="855345" cy="365760"/>
-            </a:xfrm>
-            <a:prstGeom prst="rect">
-              <a:avLst/>
-            </a:prstGeom>
-          </p:spPr>
-        </p:pic>
-      </p:grpSp>
-      <p:grpSp>
-        <p:nvGrpSpPr>
-          <p:cNvPr id="8" name="object 8"/>
-          <p:cNvGrpSpPr/>
-          <p:nvPr/>
-        </p:nvGrpSpPr>
-        <p:grpSpPr>
-          <a:xfrm>
-            <a:off x="5038090" y="3453714"/>
-            <a:ext cx="6200140" cy="366395"/>
-            <a:chOff x="5038090" y="3453714"/>
-            <a:chExt cx="6200140" cy="366395"/>
-          </a:xfrm>
-        </p:grpSpPr>
-        <p:pic>
-          <p:nvPicPr>
-            <p:cNvPr id="9" name="object 9"/>
-            <p:cNvPicPr/>
-            <p:nvPr/>
-          </p:nvPicPr>
-          <p:blipFill>
-            <a:blip r:embed="rId5" cstate="print"/>
-            <a:stretch>
-              <a:fillRect/>
-            </a:stretch>
-          </p:blipFill>
-          <p:spPr>
-            <a:xfrm>
-              <a:off x="5038090" y="3453714"/>
-              <a:ext cx="374903" cy="366064"/>
-            </a:xfrm>
-            <a:prstGeom prst="rect">
-              <a:avLst/>
-            </a:prstGeom>
-          </p:spPr>
-        </p:pic>
-        <p:pic>
-          <p:nvPicPr>
-            <p:cNvPr id="10" name="object 10"/>
-            <p:cNvPicPr/>
-            <p:nvPr/>
-          </p:nvPicPr>
-          <p:blipFill>
-            <a:blip r:embed="rId6" cstate="print"/>
-            <a:stretch>
-              <a:fillRect/>
-            </a:stretch>
-          </p:blipFill>
-          <p:spPr>
-            <a:xfrm>
-              <a:off x="5225542" y="3453714"/>
-              <a:ext cx="6012179" cy="366064"/>
-            </a:xfrm>
-            <a:prstGeom prst="rect">
-              <a:avLst/>
-            </a:prstGeom>
-          </p:spPr>
-        </p:pic>
-      </p:grpSp>
-      <p:pic>
-        <p:nvPicPr>
-          <p:cNvPr id="11" name="object 11"/>
-          <p:cNvPicPr/>
-          <p:nvPr/>
-        </p:nvPicPr>
-        <p:blipFill>
-          <a:blip r:embed="rId7" cstate="print"/>
-          <a:stretch>
-            <a:fillRect/>
-          </a:stretch>
-        </p:blipFill>
-        <p:spPr>
-          <a:xfrm>
-            <a:off x="1422678" y="2852183"/>
-            <a:ext cx="2032327" cy="1562952"/>
-          </a:xfrm>
-          <a:prstGeom prst="rect">
-            <a:avLst/>
-          </a:prstGeom>
-        </p:spPr>
-      </p:pic>
-      <p:sp>
-        <p:nvSpPr>
-          <p:cNvPr id="12" name="Slide Number Placeholder 11"/>
-          <p:cNvSpPr>
-            <a:spLocks noGrp="1"/>
-          </p:cNvSpPr>
-          <p:nvPr>
-            <p:ph type="sldNum" sz="quarter" idx="7"/>
-          </p:nvPr>
-        </p:nvSpPr>
-        <p:spPr/>
-        <p:txBody>
-          <a:bodyPr/>
-          <a:p>
-            <a:fld id="{B6F15528-21DE-4FAA-801E-634DDDAF4B2B}" type="slidenum">
-              <a:rPr/>
-            </a:fld>
-            <a:endParaRPr/>
-          </a:p>
-        </p:txBody>
-      </p:sp>
-    </p:spTree>
-  </p:cSld>
-  <p:clrMapOvr>
-    <a:masterClrMapping/>
-  </p:clrMapOvr>
-</p:sld>
-</file>
-
-<file path=ppt/slides/slide32.xml><?xml version="1.0" encoding="utf-8"?>
-<p:sld xmlns:a="http://schemas.openxmlformats.org/drawingml/2006/main" xmlns:r="http://schemas.openxmlformats.org/officeDocument/2006/relationships" xmlns:p="http://schemas.openxmlformats.org/presentationml/2006/main">
-  <p:cSld>
-    <p:spTree>
-      <p:nvGrpSpPr>
-        <p:cNvPr id="1" name=""/>
-        <p:cNvGrpSpPr/>
-        <p:nvPr/>
-      </p:nvGrpSpPr>
-      <p:grpSpPr>
-        <a:xfrm>
-          <a:off x="0" y="0"/>
-          <a:ext cx="0" cy="0"/>
-          <a:chOff x="0" y="0"/>
-          <a:chExt cx="0" cy="0"/>
-        </a:xfrm>
-      </p:grpSpPr>
-      <p:grpSp>
-        <p:nvGrpSpPr>
-          <p:cNvPr id="2" name="object 2"/>
-          <p:cNvGrpSpPr/>
-          <p:nvPr/>
-        </p:nvGrpSpPr>
-        <p:grpSpPr>
-          <a:xfrm>
-            <a:off x="6217920" y="2182367"/>
-            <a:ext cx="5257800" cy="3488690"/>
-            <a:chOff x="6217920" y="2182367"/>
-            <a:chExt cx="5257800" cy="3488690"/>
-          </a:xfrm>
-        </p:grpSpPr>
-        <p:sp>
-          <p:nvSpPr>
-            <p:cNvPr id="3" name="object 3"/>
-            <p:cNvSpPr/>
-            <p:nvPr/>
-          </p:nvSpPr>
-          <p:spPr>
-            <a:xfrm>
-              <a:off x="6217920" y="2182367"/>
-              <a:ext cx="5257800" cy="3488690"/>
-            </a:xfrm>
-            <a:custGeom>
-              <a:avLst/>
-              <a:gdLst/>
-              <a:ahLst/>
-              <a:cxnLst/>
-              <a:rect l="l" t="t" r="r" b="b"/>
-              <a:pathLst>
-                <a:path w="5257800" h="3488690">
-                  <a:moveTo>
-                    <a:pt x="5257800" y="0"/>
-                  </a:moveTo>
-                  <a:lnTo>
-                    <a:pt x="0" y="0"/>
-                  </a:lnTo>
-                  <a:lnTo>
-                    <a:pt x="0" y="3488436"/>
-                  </a:lnTo>
-                  <a:lnTo>
-                    <a:pt x="5257800" y="3488436"/>
-                  </a:lnTo>
-                  <a:lnTo>
-                    <a:pt x="5257800" y="0"/>
-                  </a:lnTo>
-                  <a:close/>
-                </a:path>
-              </a:pathLst>
-            </a:custGeom>
-            <a:solidFill>
-              <a:srgbClr val="E4E4E4"/>
-            </a:solidFill>
-          </p:spPr>
-          <p:txBody>
-            <a:bodyPr wrap="square" lIns="0" tIns="0" rIns="0" bIns="0" rtlCol="0"/>
-            <a:lstStyle/>
-            <a:p/>
-          </p:txBody>
-        </p:sp>
-        <p:pic>
-          <p:nvPicPr>
-            <p:cNvPr id="4" name="object 4"/>
-            <p:cNvPicPr/>
-            <p:nvPr/>
-          </p:nvPicPr>
-          <p:blipFill>
-            <a:blip r:embed="rId1" cstate="print"/>
-            <a:stretch>
-              <a:fillRect/>
-            </a:stretch>
-          </p:blipFill>
-          <p:spPr>
-            <a:xfrm>
-              <a:off x="7442327" y="3684396"/>
-              <a:ext cx="3043174" cy="487680"/>
-            </a:xfrm>
-            <a:prstGeom prst="rect">
-              <a:avLst/>
-            </a:prstGeom>
-          </p:spPr>
-        </p:pic>
-      </p:grpSp>
-      <p:grpSp>
-        <p:nvGrpSpPr>
-          <p:cNvPr id="5" name="object 5"/>
-          <p:cNvGrpSpPr/>
-          <p:nvPr/>
-        </p:nvGrpSpPr>
-        <p:grpSpPr>
-          <a:xfrm>
-            <a:off x="707136" y="2182367"/>
-            <a:ext cx="5257800" cy="3488690"/>
-            <a:chOff x="707136" y="2182367"/>
-            <a:chExt cx="5257800" cy="3488690"/>
-          </a:xfrm>
-        </p:grpSpPr>
-        <p:sp>
-          <p:nvSpPr>
-            <p:cNvPr id="6" name="object 6"/>
-            <p:cNvSpPr/>
-            <p:nvPr/>
-          </p:nvSpPr>
-          <p:spPr>
-            <a:xfrm>
-              <a:off x="707136" y="2182367"/>
-              <a:ext cx="5257800" cy="3488690"/>
-            </a:xfrm>
-            <a:custGeom>
-              <a:avLst/>
-              <a:gdLst/>
-              <a:ahLst/>
-              <a:cxnLst/>
-              <a:rect l="l" t="t" r="r" b="b"/>
-              <a:pathLst>
-                <a:path w="5257800" h="3488690">
-                  <a:moveTo>
-                    <a:pt x="5257800" y="0"/>
-                  </a:moveTo>
-                  <a:lnTo>
-                    <a:pt x="0" y="0"/>
-                  </a:lnTo>
-                  <a:lnTo>
-                    <a:pt x="0" y="3488436"/>
-                  </a:lnTo>
-                  <a:lnTo>
-                    <a:pt x="5257800" y="3488436"/>
-                  </a:lnTo>
-                  <a:lnTo>
-                    <a:pt x="5257800" y="0"/>
-                  </a:lnTo>
-                  <a:close/>
-                </a:path>
-              </a:pathLst>
-            </a:custGeom>
-            <a:solidFill>
-              <a:srgbClr val="E4E4E4"/>
-            </a:solidFill>
-          </p:spPr>
-          <p:txBody>
-            <a:bodyPr wrap="square" lIns="0" tIns="0" rIns="0" bIns="0" rtlCol="0"/>
-            <a:lstStyle/>
-            <a:p/>
-          </p:txBody>
-        </p:sp>
-        <p:pic>
-          <p:nvPicPr>
-            <p:cNvPr id="7" name="object 7"/>
-            <p:cNvPicPr/>
-            <p:nvPr/>
-          </p:nvPicPr>
-          <p:blipFill>
-            <a:blip r:embed="rId2" cstate="print"/>
-            <a:stretch>
-              <a:fillRect/>
-            </a:stretch>
-          </p:blipFill>
-          <p:spPr>
-            <a:xfrm>
-              <a:off x="2933700" y="3684396"/>
-              <a:ext cx="1073302" cy="487680"/>
-            </a:xfrm>
-            <a:prstGeom prst="rect">
-              <a:avLst/>
-            </a:prstGeom>
-          </p:spPr>
-        </p:pic>
-      </p:grpSp>
-      <p:pic>
-        <p:nvPicPr>
-          <p:cNvPr id="8" name="object 8"/>
-          <p:cNvPicPr/>
-          <p:nvPr/>
-        </p:nvPicPr>
-        <p:blipFill>
-          <a:blip r:embed="rId3" cstate="print"/>
-          <a:stretch>
-            <a:fillRect/>
-          </a:stretch>
-        </p:blipFill>
-        <p:spPr>
-          <a:xfrm>
-            <a:off x="4031234" y="549859"/>
-            <a:ext cx="4279773" cy="548944"/>
-          </a:xfrm>
-          <a:prstGeom prst="rect">
-            <a:avLst/>
-          </a:prstGeom>
-        </p:spPr>
-      </p:pic>
-      <p:sp>
-        <p:nvSpPr>
-          <p:cNvPr id="9" name="Slide Number Placeholder 8"/>
-          <p:cNvSpPr>
-            <a:spLocks noGrp="1"/>
-          </p:cNvSpPr>
-          <p:nvPr>
-            <p:ph type="sldNum" sz="quarter" idx="7"/>
-          </p:nvPr>
-        </p:nvSpPr>
-        <p:spPr/>
-        <p:txBody>
-          <a:bodyPr/>
-          <a:p>
-            <a:fld id="{B6F15528-21DE-4FAA-801E-634DDDAF4B2B}" type="slidenum">
-              <a:rPr/>
-            </a:fld>
-            <a:endParaRPr/>
-          </a:p>
-        </p:txBody>
-      </p:sp>
-    </p:spTree>
-  </p:cSld>
-  <p:clrMapOvr>
-    <a:masterClrMapping/>
-  </p:clrMapOvr>
-</p:sld>
-</file>
-
-<file path=ppt/slides/slide33.xml><?xml version="1.0" encoding="utf-8"?>
-<p:sld xmlns:a="http://schemas.openxmlformats.org/drawingml/2006/main" xmlns:r="http://schemas.openxmlformats.org/officeDocument/2006/relationships" xmlns:p="http://schemas.openxmlformats.org/presentationml/2006/main">
-  <p:cSld>
-    <p:spTree>
-      <p:nvGrpSpPr>
-        <p:cNvPr id="1" name=""/>
-        <p:cNvGrpSpPr/>
-        <p:nvPr/>
-      </p:nvGrpSpPr>
-      <p:grpSpPr>
-        <a:xfrm>
-          <a:off x="0" y="0"/>
-          <a:ext cx="0" cy="0"/>
-          <a:chOff x="0" y="0"/>
-          <a:chExt cx="0" cy="0"/>
-        </a:xfrm>
-      </p:grpSpPr>
-      <p:sp>
-        <p:nvSpPr>
-          <p:cNvPr id="2" name="object 2"/>
-          <p:cNvSpPr/>
-          <p:nvPr/>
-        </p:nvSpPr>
-        <p:spPr>
-          <a:xfrm>
-            <a:off x="4584953" y="1572005"/>
-            <a:ext cx="0" cy="4131310"/>
-          </a:xfrm>
-          <a:custGeom>
-            <a:avLst/>
-            <a:gdLst/>
-            <a:ahLst/>
-            <a:cxnLst/>
-            <a:rect l="l" t="t" r="r" b="b"/>
-            <a:pathLst>
-              <a:path h="4131310">
-                <a:moveTo>
-                  <a:pt x="0" y="0"/>
-                </a:moveTo>
-                <a:lnTo>
-                  <a:pt x="0" y="4130941"/>
-                </a:lnTo>
-              </a:path>
-            </a:pathLst>
-          </a:custGeom>
-          <a:ln w="25908">
-            <a:solidFill>
-              <a:srgbClr val="EF5A28"/>
-            </a:solidFill>
-          </a:ln>
-        </p:spPr>
-        <p:txBody>
-          <a:bodyPr wrap="square" lIns="0" tIns="0" rIns="0" bIns="0" rtlCol="0"/>
-          <a:lstStyle/>
-          <a:p/>
-        </p:txBody>
-      </p:sp>
-      <p:pic>
-        <p:nvPicPr>
-          <p:cNvPr id="3" name="object 3"/>
-          <p:cNvPicPr/>
-          <p:nvPr/>
-        </p:nvPicPr>
-        <p:blipFill>
-          <a:blip r:embed="rId1" cstate="print"/>
-          <a:stretch>
-            <a:fillRect/>
-          </a:stretch>
-        </p:blipFill>
-        <p:spPr>
-          <a:xfrm>
-            <a:off x="3738626" y="544652"/>
-            <a:ext cx="4884547" cy="548944"/>
-          </a:xfrm>
-          <a:prstGeom prst="rect">
-            <a:avLst/>
-          </a:prstGeom>
-        </p:spPr>
-      </p:pic>
-      <p:pic>
-        <p:nvPicPr>
-          <p:cNvPr id="4" name="object 4"/>
-          <p:cNvPicPr/>
-          <p:nvPr/>
-        </p:nvPicPr>
-        <p:blipFill>
-          <a:blip r:embed="rId2" cstate="print"/>
-          <a:stretch>
-            <a:fillRect/>
-          </a:stretch>
-        </p:blipFill>
-        <p:spPr>
-          <a:xfrm>
-            <a:off x="5038090" y="2859658"/>
-            <a:ext cx="4457827" cy="365760"/>
-          </a:xfrm>
-          <a:prstGeom prst="rect">
-            <a:avLst/>
-          </a:prstGeom>
-        </p:spPr>
-      </p:pic>
-      <p:pic>
-        <p:nvPicPr>
-          <p:cNvPr id="5" name="object 5"/>
-          <p:cNvPicPr/>
-          <p:nvPr/>
-        </p:nvPicPr>
-        <p:blipFill>
-          <a:blip r:embed="rId3" cstate="print"/>
-          <a:stretch>
-            <a:fillRect/>
-          </a:stretch>
-        </p:blipFill>
-        <p:spPr>
-          <a:xfrm>
-            <a:off x="5038090" y="3453714"/>
-            <a:ext cx="4428490" cy="366064"/>
-          </a:xfrm>
-          <a:prstGeom prst="rect">
-            <a:avLst/>
-          </a:prstGeom>
-        </p:spPr>
-      </p:pic>
-      <p:pic>
-        <p:nvPicPr>
-          <p:cNvPr id="6" name="object 6"/>
-          <p:cNvPicPr/>
-          <p:nvPr/>
-        </p:nvPicPr>
-        <p:blipFill>
-          <a:blip r:embed="rId4" cstate="print"/>
-          <a:stretch>
-            <a:fillRect/>
-          </a:stretch>
-        </p:blipFill>
-        <p:spPr>
-          <a:xfrm>
-            <a:off x="5038090" y="4048633"/>
-            <a:ext cx="5214112" cy="365760"/>
-          </a:xfrm>
-          <a:prstGeom prst="rect">
-            <a:avLst/>
-          </a:prstGeom>
-        </p:spPr>
-      </p:pic>
-      <p:pic>
-        <p:nvPicPr>
-          <p:cNvPr id="7" name="object 7"/>
-          <p:cNvPicPr/>
-          <p:nvPr/>
-        </p:nvPicPr>
-        <p:blipFill>
-          <a:blip r:embed="rId5" cstate="print"/>
-          <a:stretch>
-            <a:fillRect/>
-          </a:stretch>
-        </p:blipFill>
-        <p:spPr>
-          <a:xfrm>
-            <a:off x="1411147" y="2801081"/>
-            <a:ext cx="1686687" cy="1670364"/>
-          </a:xfrm>
-          <a:prstGeom prst="rect">
-            <a:avLst/>
-          </a:prstGeom>
-        </p:spPr>
-      </p:pic>
-      <p:sp>
-        <p:nvSpPr>
-          <p:cNvPr id="8" name="Slide Number Placeholder 7"/>
-          <p:cNvSpPr>
-            <a:spLocks noGrp="1"/>
-          </p:cNvSpPr>
-          <p:nvPr>
-            <p:ph type="sldNum" sz="quarter" idx="7"/>
-          </p:nvPr>
-        </p:nvSpPr>
-        <p:spPr/>
-        <p:txBody>
-          <a:bodyPr/>
-          <a:p>
-            <a:fld id="{B6F15528-21DE-4FAA-801E-634DDDAF4B2B}" type="slidenum">
-              <a:rPr/>
-            </a:fld>
-            <a:endParaRPr/>
-          </a:p>
-        </p:txBody>
-      </p:sp>
-    </p:spTree>
-  </p:cSld>
-  <p:clrMapOvr>
-    <a:masterClrMapping/>
-  </p:clrMapOvr>
-</p:sld>
-</file>
-
-<file path=ppt/slides/slide34.xml><?xml version="1.0" encoding="utf-8"?>
-<p:sld xmlns:a="http://schemas.openxmlformats.org/drawingml/2006/main" xmlns:r="http://schemas.openxmlformats.org/officeDocument/2006/relationships" xmlns:p="http://schemas.openxmlformats.org/presentationml/2006/main">
-  <p:cSld>
-    <p:spTree>
-      <p:nvGrpSpPr>
-        <p:cNvPr id="1" name=""/>
-        <p:cNvGrpSpPr/>
-        <p:nvPr/>
-      </p:nvGrpSpPr>
-      <p:grpSpPr>
-        <a:xfrm>
-          <a:off x="0" y="0"/>
-          <a:ext cx="0" cy="0"/>
-          <a:chOff x="0" y="0"/>
-          <a:chExt cx="0" cy="0"/>
-        </a:xfrm>
-      </p:grpSpPr>
-      <p:sp>
-        <p:nvSpPr>
-          <p:cNvPr id="2" name="object 2"/>
-          <p:cNvSpPr/>
-          <p:nvPr/>
-        </p:nvSpPr>
-        <p:spPr>
-          <a:xfrm>
-            <a:off x="4584953" y="1572005"/>
-            <a:ext cx="0" cy="4131310"/>
-          </a:xfrm>
-          <a:custGeom>
-            <a:avLst/>
-            <a:gdLst/>
-            <a:ahLst/>
-            <a:cxnLst/>
-            <a:rect l="l" t="t" r="r" b="b"/>
-            <a:pathLst>
-              <a:path h="4131310">
-                <a:moveTo>
-                  <a:pt x="0" y="0"/>
-                </a:moveTo>
-                <a:lnTo>
-                  <a:pt x="0" y="4130941"/>
-                </a:lnTo>
-              </a:path>
-            </a:pathLst>
-          </a:custGeom>
-          <a:ln w="25908">
-            <a:solidFill>
-              <a:srgbClr val="EF5A28"/>
-            </a:solidFill>
-          </a:ln>
-        </p:spPr>
-        <p:txBody>
-          <a:bodyPr wrap="square" lIns="0" tIns="0" rIns="0" bIns="0" rtlCol="0"/>
-          <a:lstStyle/>
-          <a:p/>
-        </p:txBody>
-      </p:sp>
-      <p:pic>
-        <p:nvPicPr>
-          <p:cNvPr id="3" name="object 3"/>
-          <p:cNvPicPr/>
-          <p:nvPr/>
-        </p:nvPicPr>
-        <p:blipFill>
-          <a:blip r:embed="rId1" cstate="print"/>
-          <a:stretch>
-            <a:fillRect/>
-          </a:stretch>
-        </p:blipFill>
-        <p:spPr>
-          <a:xfrm>
-            <a:off x="851944" y="2729142"/>
-            <a:ext cx="2697307" cy="1785445"/>
-          </a:xfrm>
-          <a:prstGeom prst="rect">
-            <a:avLst/>
-          </a:prstGeom>
-        </p:spPr>
-      </p:pic>
-      <p:pic>
-        <p:nvPicPr>
-          <p:cNvPr id="4" name="object 4"/>
-          <p:cNvPicPr/>
-          <p:nvPr/>
-        </p:nvPicPr>
-        <p:blipFill>
-          <a:blip r:embed="rId2" cstate="print"/>
-          <a:stretch>
-            <a:fillRect/>
-          </a:stretch>
-        </p:blipFill>
-        <p:spPr>
-          <a:xfrm>
-            <a:off x="4774946" y="544652"/>
-            <a:ext cx="2810002" cy="548944"/>
-          </a:xfrm>
-          <a:prstGeom prst="rect">
-            <a:avLst/>
-          </a:prstGeom>
-        </p:spPr>
-      </p:pic>
-      <p:pic>
-        <p:nvPicPr>
-          <p:cNvPr id="5" name="object 5"/>
-          <p:cNvPicPr/>
-          <p:nvPr/>
-        </p:nvPicPr>
-        <p:blipFill>
-          <a:blip r:embed="rId3" cstate="print"/>
-          <a:stretch>
-            <a:fillRect/>
-          </a:stretch>
-        </p:blipFill>
-        <p:spPr>
-          <a:xfrm>
-            <a:off x="5096002" y="2859658"/>
-            <a:ext cx="4507738" cy="365760"/>
-          </a:xfrm>
-          <a:prstGeom prst="rect">
-            <a:avLst/>
-          </a:prstGeom>
-        </p:spPr>
-      </p:pic>
-      <p:pic>
-        <p:nvPicPr>
-          <p:cNvPr id="6" name="object 6"/>
-          <p:cNvPicPr/>
-          <p:nvPr/>
-        </p:nvPicPr>
-        <p:blipFill>
-          <a:blip r:embed="rId4" cstate="print"/>
-          <a:stretch>
-            <a:fillRect/>
-          </a:stretch>
-        </p:blipFill>
-        <p:spPr>
-          <a:xfrm>
-            <a:off x="5096002" y="3453714"/>
-            <a:ext cx="5797423" cy="366064"/>
-          </a:xfrm>
-          <a:prstGeom prst="rect">
-            <a:avLst/>
-          </a:prstGeom>
-        </p:spPr>
-      </p:pic>
-      <p:pic>
-        <p:nvPicPr>
-          <p:cNvPr id="7" name="object 7"/>
-          <p:cNvPicPr/>
-          <p:nvPr/>
-        </p:nvPicPr>
-        <p:blipFill>
-          <a:blip r:embed="rId5" cstate="print"/>
-          <a:stretch>
-            <a:fillRect/>
-          </a:stretch>
-        </p:blipFill>
-        <p:spPr>
-          <a:xfrm>
-            <a:off x="5096002" y="4048633"/>
-            <a:ext cx="3816984" cy="365760"/>
-          </a:xfrm>
-          <a:prstGeom prst="rect">
-            <a:avLst/>
-          </a:prstGeom>
-        </p:spPr>
-      </p:pic>
-      <p:sp>
-        <p:nvSpPr>
-          <p:cNvPr id="8" name="Slide Number Placeholder 7"/>
-          <p:cNvSpPr>
-            <a:spLocks noGrp="1"/>
-          </p:cNvSpPr>
-          <p:nvPr>
-            <p:ph type="sldNum" sz="quarter" idx="7"/>
-          </p:nvPr>
-        </p:nvSpPr>
-        <p:spPr/>
-        <p:txBody>
-          <a:bodyPr/>
-          <a:p>
-            <a:fld id="{B6F15528-21DE-4FAA-801E-634DDDAF4B2B}" type="slidenum">
-              <a:rPr/>
-            </a:fld>
-            <a:endParaRPr/>
-          </a:p>
-        </p:txBody>
-      </p:sp>
-    </p:spTree>
-  </p:cSld>
-  <p:clrMapOvr>
-    <a:masterClrMapping/>
-  </p:clrMapOvr>
-</p:sld>
-</file>
-
-<file path=ppt/slides/slide35.xml><?xml version="1.0" encoding="utf-8"?>
-<p:sld xmlns:a="http://schemas.openxmlformats.org/drawingml/2006/main" xmlns:r="http://schemas.openxmlformats.org/officeDocument/2006/relationships" xmlns:p="http://schemas.openxmlformats.org/presentationml/2006/main">
-  <p:cSld>
-    <p:spTree>
-      <p:nvGrpSpPr>
-        <p:cNvPr id="1" name=""/>
-        <p:cNvGrpSpPr/>
-        <p:nvPr/>
-      </p:nvGrpSpPr>
-      <p:grpSpPr>
-        <a:xfrm>
-          <a:off x="0" y="0"/>
-          <a:ext cx="0" cy="0"/>
-          <a:chOff x="0" y="0"/>
-          <a:chExt cx="0" cy="0"/>
-        </a:xfrm>
-      </p:grpSpPr>
-      <p:grpSp>
-        <p:nvGrpSpPr>
-          <p:cNvPr id="2" name="object 2"/>
-          <p:cNvGrpSpPr/>
-          <p:nvPr/>
-        </p:nvGrpSpPr>
-        <p:grpSpPr>
-          <a:xfrm>
-            <a:off x="0" y="0"/>
-            <a:ext cx="4636135" cy="6858000"/>
-            <a:chOff x="0" y="0"/>
-            <a:chExt cx="4636135" cy="6858000"/>
-          </a:xfrm>
-        </p:grpSpPr>
-        <p:pic>
-          <p:nvPicPr>
-            <p:cNvPr id="3" name="object 3"/>
-            <p:cNvPicPr/>
-            <p:nvPr/>
-          </p:nvPicPr>
-          <p:blipFill>
-            <a:blip r:embed="rId1" cstate="print"/>
-            <a:stretch>
-              <a:fillRect/>
-            </a:stretch>
-          </p:blipFill>
-          <p:spPr>
-            <a:xfrm>
-              <a:off x="0" y="0"/>
-              <a:ext cx="4636008" cy="6858000"/>
-            </a:xfrm>
-            <a:prstGeom prst="rect">
-              <a:avLst/>
-            </a:prstGeom>
-          </p:spPr>
-        </p:pic>
-        <p:pic>
-          <p:nvPicPr>
-            <p:cNvPr id="4" name="object 4"/>
-            <p:cNvPicPr/>
-            <p:nvPr/>
-          </p:nvPicPr>
-          <p:blipFill>
-            <a:blip r:embed="rId2" cstate="print"/>
-            <a:stretch>
-              <a:fillRect/>
-            </a:stretch>
-          </p:blipFill>
-          <p:spPr>
-            <a:xfrm>
-              <a:off x="1639189" y="1948560"/>
-              <a:ext cx="1689735" cy="548639"/>
-            </a:xfrm>
-            <a:prstGeom prst="rect">
-              <a:avLst/>
-            </a:prstGeom>
-          </p:spPr>
-        </p:pic>
-        <p:pic>
-          <p:nvPicPr>
-            <p:cNvPr id="5" name="object 5"/>
-            <p:cNvPicPr/>
-            <p:nvPr/>
-          </p:nvPicPr>
-          <p:blipFill>
-            <a:blip r:embed="rId3" cstate="print"/>
-            <a:stretch>
-              <a:fillRect/>
-            </a:stretch>
-          </p:blipFill>
-          <p:spPr>
-            <a:xfrm>
-              <a:off x="0" y="45719"/>
-              <a:ext cx="48463" cy="640333"/>
-            </a:xfrm>
-            <a:prstGeom prst="rect">
-              <a:avLst/>
-            </a:prstGeom>
-          </p:spPr>
-        </p:pic>
-      </p:grpSp>
-      <p:pic>
-        <p:nvPicPr>
-          <p:cNvPr id="6" name="object 6"/>
-          <p:cNvPicPr/>
-          <p:nvPr/>
-        </p:nvPicPr>
-        <p:blipFill>
-          <a:blip r:embed="rId4" cstate="print"/>
-          <a:stretch>
-            <a:fillRect/>
-          </a:stretch>
-        </p:blipFill>
-        <p:spPr>
-          <a:xfrm>
-            <a:off x="5240146" y="1952498"/>
-            <a:ext cx="2814574" cy="365760"/>
-          </a:xfrm>
-          <a:prstGeom prst="rect">
-            <a:avLst/>
-          </a:prstGeom>
-        </p:spPr>
-      </p:pic>
-      <p:pic>
-        <p:nvPicPr>
-          <p:cNvPr id="7" name="object 7"/>
-          <p:cNvPicPr/>
-          <p:nvPr/>
-        </p:nvPicPr>
-        <p:blipFill>
-          <a:blip r:embed="rId5" cstate="print"/>
-          <a:stretch>
-            <a:fillRect/>
-          </a:stretch>
-        </p:blipFill>
-        <p:spPr>
-          <a:xfrm>
-            <a:off x="5182234" y="2546857"/>
-            <a:ext cx="4530470" cy="365760"/>
-          </a:xfrm>
-          <a:prstGeom prst="rect">
-            <a:avLst/>
-          </a:prstGeom>
-        </p:spPr>
-      </p:pic>
-      <p:pic>
-        <p:nvPicPr>
-          <p:cNvPr id="8" name="object 8"/>
-          <p:cNvPicPr/>
-          <p:nvPr/>
-        </p:nvPicPr>
-        <p:blipFill>
-          <a:blip r:embed="rId6" cstate="print"/>
-          <a:stretch>
-            <a:fillRect/>
-          </a:stretch>
-        </p:blipFill>
-        <p:spPr>
-          <a:xfrm>
-            <a:off x="5182234" y="3140913"/>
-            <a:ext cx="3221863" cy="366064"/>
-          </a:xfrm>
-          <a:prstGeom prst="rect">
-            <a:avLst/>
-          </a:prstGeom>
-        </p:spPr>
-      </p:pic>
-      <p:pic>
-        <p:nvPicPr>
-          <p:cNvPr id="9" name="object 9"/>
-          <p:cNvPicPr/>
-          <p:nvPr/>
-        </p:nvPicPr>
-        <p:blipFill>
-          <a:blip r:embed="rId7" cstate="print"/>
-          <a:stretch>
-            <a:fillRect/>
-          </a:stretch>
-        </p:blipFill>
-        <p:spPr>
-          <a:xfrm>
-            <a:off x="5182234" y="3735959"/>
-            <a:ext cx="4379722" cy="365760"/>
-          </a:xfrm>
-          <a:prstGeom prst="rect">
-            <a:avLst/>
-          </a:prstGeom>
-        </p:spPr>
-      </p:pic>
-      <p:pic>
-        <p:nvPicPr>
-          <p:cNvPr id="10" name="object 10"/>
-          <p:cNvPicPr/>
-          <p:nvPr/>
-        </p:nvPicPr>
-        <p:blipFill>
-          <a:blip r:embed="rId8" cstate="print"/>
-          <a:stretch>
-            <a:fillRect/>
-          </a:stretch>
-        </p:blipFill>
-        <p:spPr>
-          <a:xfrm>
-            <a:off x="5182234" y="4330014"/>
-            <a:ext cx="6269228" cy="366064"/>
-          </a:xfrm>
-          <a:prstGeom prst="rect">
-            <a:avLst/>
-          </a:prstGeom>
-        </p:spPr>
-      </p:pic>
-      <p:sp>
-        <p:nvSpPr>
-          <p:cNvPr id="11" name="Slide Number Placeholder 10"/>
-          <p:cNvSpPr>
-            <a:spLocks noGrp="1"/>
-          </p:cNvSpPr>
-          <p:nvPr>
-            <p:ph type="sldNum" sz="quarter" idx="7"/>
-          </p:nvPr>
-        </p:nvSpPr>
-        <p:spPr/>
-        <p:txBody>
-          <a:bodyPr/>
-          <a:p>
-            <a:fld id="{B6F15528-21DE-4FAA-801E-634DDDAF4B2B}" type="slidenum">
-              <a:rPr/>
-            </a:fld>
-            <a:endParaRPr/>
-          </a:p>
-        </p:txBody>
-      </p:sp>
-    </p:spTree>
-  </p:cSld>
-  <p:clrMapOvr>
-    <a:masterClrMapping/>
-  </p:clrMapOvr>
-</p:sld>
-</file>
-
-<file path=ppt/slides/slide36.xml><?xml version="1.0" encoding="utf-8"?>
-<p:sld xmlns:a="http://schemas.openxmlformats.org/drawingml/2006/main" xmlns:r="http://schemas.openxmlformats.org/officeDocument/2006/relationships" xmlns:p="http://schemas.openxmlformats.org/presentationml/2006/main">
-  <p:cSld>
-    <p:spTree>
-      <p:nvGrpSpPr>
-        <p:cNvPr id="1" name=""/>
-        <p:cNvGrpSpPr/>
-        <p:nvPr/>
-      </p:nvGrpSpPr>
-      <p:grpSpPr>
-        <a:xfrm>
-          <a:off x="0" y="0"/>
-          <a:ext cx="0" cy="0"/>
-          <a:chOff x="0" y="0"/>
-          <a:chExt cx="0" cy="0"/>
-        </a:xfrm>
-      </p:grpSpPr>
-      <p:pic>
-        <p:nvPicPr>
-          <p:cNvPr id="2" name="object 2"/>
-          <p:cNvPicPr/>
-          <p:nvPr/>
-        </p:nvPicPr>
-        <p:blipFill>
-          <a:blip r:embed="rId1" cstate="print"/>
-          <a:stretch>
-            <a:fillRect/>
-          </a:stretch>
-        </p:blipFill>
-        <p:spPr>
-          <a:xfrm>
-            <a:off x="0" y="0"/>
-            <a:ext cx="4636008" cy="6858000"/>
-          </a:xfrm>
-          <a:prstGeom prst="rect">
-            <a:avLst/>
-          </a:prstGeom>
-        </p:spPr>
-      </p:pic>
-      <p:pic>
-        <p:nvPicPr>
-          <p:cNvPr id="3" name="object 3"/>
-          <p:cNvPicPr/>
-          <p:nvPr/>
-        </p:nvPicPr>
-        <p:blipFill>
-          <a:blip r:embed="rId2" cstate="print"/>
-          <a:stretch>
-            <a:fillRect/>
-          </a:stretch>
-        </p:blipFill>
-        <p:spPr>
-          <a:xfrm>
-            <a:off x="5240146" y="728472"/>
-            <a:ext cx="3257930" cy="365760"/>
-          </a:xfrm>
-          <a:prstGeom prst="rect">
-            <a:avLst/>
-          </a:prstGeom>
-        </p:spPr>
-      </p:pic>
-      <p:pic>
-        <p:nvPicPr>
-          <p:cNvPr id="4" name="object 4"/>
-          <p:cNvPicPr/>
-          <p:nvPr/>
-        </p:nvPicPr>
-        <p:blipFill>
-          <a:blip r:embed="rId3" cstate="print"/>
-          <a:stretch>
-            <a:fillRect/>
-          </a:stretch>
-        </p:blipFill>
-        <p:spPr>
-          <a:xfrm>
-            <a:off x="5240146" y="1322832"/>
-            <a:ext cx="4463796" cy="365760"/>
-          </a:xfrm>
-          <a:prstGeom prst="rect">
-            <a:avLst/>
-          </a:prstGeom>
-        </p:spPr>
-      </p:pic>
-      <p:pic>
-        <p:nvPicPr>
-          <p:cNvPr id="5" name="object 5"/>
-          <p:cNvPicPr/>
-          <p:nvPr/>
-        </p:nvPicPr>
-        <p:blipFill>
-          <a:blip r:embed="rId4" cstate="print"/>
-          <a:stretch>
-            <a:fillRect/>
-          </a:stretch>
-        </p:blipFill>
-        <p:spPr>
-          <a:xfrm>
-            <a:off x="5240146" y="1917445"/>
-            <a:ext cx="2429382" cy="365760"/>
-          </a:xfrm>
-          <a:prstGeom prst="rect">
-            <a:avLst/>
-          </a:prstGeom>
-        </p:spPr>
-      </p:pic>
-      <p:sp>
-        <p:nvSpPr>
-          <p:cNvPr id="6" name="object 6"/>
-          <p:cNvSpPr txBox="1"/>
-          <p:nvPr/>
-        </p:nvSpPr>
-        <p:spPr>
-          <a:xfrm>
-            <a:off x="5466715" y="2410714"/>
-            <a:ext cx="116839" cy="299720"/>
-          </a:xfrm>
-          <a:prstGeom prst="rect">
-            <a:avLst/>
-          </a:prstGeom>
-        </p:spPr>
-        <p:txBody>
-          <a:bodyPr vert="horz" wrap="square" lIns="0" tIns="12700" rIns="0" bIns="0" rtlCol="0">
-            <a:spAutoFit/>
-          </a:bodyPr>
-          <a:lstStyle/>
-          <a:p>
-            <a:pPr marL="12700">
-              <a:lnSpc>
-                <a:spcPct val="100000"/>
-              </a:lnSpc>
-              <a:spcBef>
-                <a:spcPts val="100"/>
-              </a:spcBef>
-            </a:pPr>
-            <a:r>
-              <a:rPr sz="1800" dirty="0">
-                <a:solidFill>
-                  <a:srgbClr val="EF5A28"/>
-                </a:solidFill>
-                <a:latin typeface="Segoe UI" panose="020B0502040204020203"/>
-                <a:cs typeface="Segoe UI" panose="020B0502040204020203"/>
-              </a:rPr>
-              <a:t>-</a:t>
-            </a:r>
-            <a:endParaRPr sz="1800">
-              <a:latin typeface="Segoe UI" panose="020B0502040204020203"/>
-              <a:cs typeface="Segoe UI" panose="020B0502040204020203"/>
-            </a:endParaRPr>
-          </a:p>
-        </p:txBody>
-      </p:sp>
-      <p:pic>
-        <p:nvPicPr>
-          <p:cNvPr id="7" name="object 7"/>
-          <p:cNvPicPr/>
-          <p:nvPr/>
-        </p:nvPicPr>
-        <p:blipFill>
-          <a:blip r:embed="rId5" cstate="print"/>
-          <a:stretch>
-            <a:fillRect/>
-          </a:stretch>
-        </p:blipFill>
-        <p:spPr>
-          <a:xfrm>
-            <a:off x="5768975" y="2359405"/>
-            <a:ext cx="3311398" cy="365760"/>
-          </a:xfrm>
-          <a:prstGeom prst="rect">
-            <a:avLst/>
-          </a:prstGeom>
-        </p:spPr>
-      </p:pic>
-      <p:pic>
-        <p:nvPicPr>
-          <p:cNvPr id="8" name="object 8"/>
-          <p:cNvPicPr/>
-          <p:nvPr/>
-        </p:nvPicPr>
-        <p:blipFill>
-          <a:blip r:embed="rId6" cstate="print"/>
-          <a:stretch>
-            <a:fillRect/>
-          </a:stretch>
-        </p:blipFill>
-        <p:spPr>
-          <a:xfrm>
-            <a:off x="5240146" y="2953461"/>
-            <a:ext cx="4869941" cy="366064"/>
-          </a:xfrm>
-          <a:prstGeom prst="rect">
-            <a:avLst/>
-          </a:prstGeom>
-        </p:spPr>
-      </p:pic>
-      <p:pic>
-        <p:nvPicPr>
-          <p:cNvPr id="9" name="object 9"/>
-          <p:cNvPicPr/>
-          <p:nvPr/>
-        </p:nvPicPr>
-        <p:blipFill>
-          <a:blip r:embed="rId7" cstate="print"/>
-          <a:stretch>
-            <a:fillRect/>
-          </a:stretch>
-        </p:blipFill>
-        <p:spPr>
-          <a:xfrm>
-            <a:off x="5240146" y="3548507"/>
-            <a:ext cx="3261105" cy="365759"/>
-          </a:xfrm>
-          <a:prstGeom prst="rect">
-            <a:avLst/>
-          </a:prstGeom>
-        </p:spPr>
-      </p:pic>
-      <p:sp>
-        <p:nvSpPr>
-          <p:cNvPr id="10" name="object 10"/>
-          <p:cNvSpPr txBox="1"/>
-          <p:nvPr/>
-        </p:nvSpPr>
-        <p:spPr>
-          <a:xfrm>
-            <a:off x="5466715" y="4041775"/>
-            <a:ext cx="116839" cy="742315"/>
-          </a:xfrm>
-          <a:prstGeom prst="rect">
-            <a:avLst/>
-          </a:prstGeom>
-        </p:spPr>
-        <p:txBody>
-          <a:bodyPr vert="horz" wrap="square" lIns="0" tIns="12700" rIns="0" bIns="0" rtlCol="0">
-            <a:spAutoFit/>
-          </a:bodyPr>
-          <a:lstStyle/>
-          <a:p>
-            <a:pPr marL="12700">
-              <a:lnSpc>
-                <a:spcPct val="100000"/>
-              </a:lnSpc>
-              <a:spcBef>
-                <a:spcPts val="100"/>
-              </a:spcBef>
-            </a:pPr>
-            <a:r>
-              <a:rPr sz="1800" dirty="0">
-                <a:solidFill>
-                  <a:srgbClr val="EF5A28"/>
-                </a:solidFill>
-                <a:latin typeface="Segoe UI" panose="020B0502040204020203"/>
-                <a:cs typeface="Segoe UI" panose="020B0502040204020203"/>
-              </a:rPr>
-              <a:t>-</a:t>
-            </a:r>
-            <a:endParaRPr sz="1800">
-              <a:latin typeface="Segoe UI" panose="020B0502040204020203"/>
-              <a:cs typeface="Segoe UI" panose="020B0502040204020203"/>
-            </a:endParaRPr>
-          </a:p>
-          <a:p>
-            <a:pPr marL="12700">
-              <a:lnSpc>
-                <a:spcPct val="100000"/>
-              </a:lnSpc>
-              <a:spcBef>
-                <a:spcPts val="1320"/>
-              </a:spcBef>
-            </a:pPr>
-            <a:r>
-              <a:rPr sz="1800" dirty="0">
-                <a:solidFill>
-                  <a:srgbClr val="EF5A28"/>
-                </a:solidFill>
-                <a:latin typeface="Segoe UI" panose="020B0502040204020203"/>
-                <a:cs typeface="Segoe UI" panose="020B0502040204020203"/>
-              </a:rPr>
-              <a:t>-</a:t>
-            </a:r>
-            <a:endParaRPr sz="1800">
-              <a:latin typeface="Segoe UI" panose="020B0502040204020203"/>
-              <a:cs typeface="Segoe UI" panose="020B0502040204020203"/>
-            </a:endParaRPr>
-          </a:p>
-        </p:txBody>
-      </p:sp>
-      <p:pic>
-        <p:nvPicPr>
-          <p:cNvPr id="11" name="object 11"/>
-          <p:cNvPicPr/>
-          <p:nvPr/>
-        </p:nvPicPr>
-        <p:blipFill>
-          <a:blip r:embed="rId8" cstate="print"/>
-          <a:stretch>
-            <a:fillRect/>
-          </a:stretch>
-        </p:blipFill>
-        <p:spPr>
-          <a:xfrm>
-            <a:off x="5768975" y="3990416"/>
-            <a:ext cx="3920617" cy="366064"/>
-          </a:xfrm>
-          <a:prstGeom prst="rect">
-            <a:avLst/>
-          </a:prstGeom>
-        </p:spPr>
-      </p:pic>
-      <p:pic>
-        <p:nvPicPr>
-          <p:cNvPr id="12" name="object 12"/>
-          <p:cNvPicPr/>
-          <p:nvPr/>
-        </p:nvPicPr>
-        <p:blipFill>
-          <a:blip r:embed="rId9" cstate="print"/>
-          <a:stretch>
-            <a:fillRect/>
-          </a:stretch>
-        </p:blipFill>
-        <p:spPr>
-          <a:xfrm>
-            <a:off x="5768975" y="4432680"/>
-            <a:ext cx="2241423" cy="365760"/>
-          </a:xfrm>
-          <a:prstGeom prst="rect">
-            <a:avLst/>
-          </a:prstGeom>
-        </p:spPr>
-      </p:pic>
-      <p:pic>
-        <p:nvPicPr>
-          <p:cNvPr id="13" name="object 13"/>
-          <p:cNvPicPr/>
-          <p:nvPr/>
-        </p:nvPicPr>
-        <p:blipFill>
-          <a:blip r:embed="rId10" cstate="print"/>
-          <a:stretch>
-            <a:fillRect/>
-          </a:stretch>
-        </p:blipFill>
-        <p:spPr>
-          <a:xfrm>
-            <a:off x="5240146" y="5027040"/>
-            <a:ext cx="4813427" cy="365760"/>
-          </a:xfrm>
-          <a:prstGeom prst="rect">
-            <a:avLst/>
-          </a:prstGeom>
-        </p:spPr>
-      </p:pic>
-      <p:pic>
-        <p:nvPicPr>
-          <p:cNvPr id="14" name="object 14"/>
-          <p:cNvPicPr/>
-          <p:nvPr/>
-        </p:nvPicPr>
-        <p:blipFill>
-          <a:blip r:embed="rId11" cstate="print"/>
-          <a:stretch>
-            <a:fillRect/>
-          </a:stretch>
-        </p:blipFill>
-        <p:spPr>
-          <a:xfrm>
-            <a:off x="5240146" y="5621731"/>
-            <a:ext cx="6148451" cy="365759"/>
-          </a:xfrm>
-          <a:prstGeom prst="rect">
-            <a:avLst/>
-          </a:prstGeom>
-        </p:spPr>
-      </p:pic>
-      <p:pic>
-        <p:nvPicPr>
-          <p:cNvPr id="15" name="object 15"/>
-          <p:cNvPicPr/>
-          <p:nvPr/>
-        </p:nvPicPr>
-        <p:blipFill>
-          <a:blip r:embed="rId12" cstate="print"/>
-          <a:stretch>
-            <a:fillRect/>
-          </a:stretch>
-        </p:blipFill>
-        <p:spPr>
-          <a:xfrm>
-            <a:off x="1239926" y="1947621"/>
-            <a:ext cx="2463165" cy="548944"/>
-          </a:xfrm>
-          <a:prstGeom prst="rect">
-            <a:avLst/>
-          </a:prstGeom>
-        </p:spPr>
-      </p:pic>
-      <p:sp>
-        <p:nvSpPr>
-          <p:cNvPr id="16" name="Slide Number Placeholder 15"/>
           <p:cNvSpPr>
             <a:spLocks noGrp="1"/>
           </p:cNvSpPr>

</xml_diff>

<commit_message>
Updated Day 5 - Slides and Supporting Materials.
</commit_message>
<xml_diff>
--- a/Day 5/Slides/3. Backing Up Volumes/backing-up-volumes-slides.pptx
+++ b/Day 5/Slides/3. Backing Up Volumes/backing-up-volumes-slides.pptx
@@ -5,7 +5,7 @@
     <p:sldMasterId id="2147483648" r:id="rId1"/>
   </p:sldMasterIdLst>
   <p:notesMasterIdLst>
-    <p:notesMasterId r:id="rId31"/>
+    <p:notesMasterId r:id="rId32"/>
   </p:notesMasterIdLst>
   <p:sldIdLst>
     <p:sldId id="256" r:id="rId3"/>
@@ -35,7 +35,8 @@
     <p:sldId id="280" r:id="rId27"/>
     <p:sldId id="281" r:id="rId28"/>
     <p:sldId id="282" r:id="rId29"/>
-    <p:sldId id="291" r:id="rId30"/>
+    <p:sldId id="292" r:id="rId30"/>
+    <p:sldId id="294" r:id="rId31"/>
   </p:sldIdLst>
   <p:sldSz cx="12192000" cy="6858000"/>
   <p:notesSz cx="12192000" cy="6858000"/>
@@ -17921,76 +17922,6 @@
           </a:prstGeom>
         </p:spPr>
       </p:pic>
-      <p:sp>
-        <p:nvSpPr>
-          <p:cNvPr id="7" name="object 7"/>
-          <p:cNvSpPr txBox="1"/>
-          <p:nvPr/>
-        </p:nvSpPr>
-        <p:spPr>
-          <a:xfrm>
-            <a:off x="5466715" y="2895346"/>
-            <a:ext cx="116839" cy="742315"/>
-          </a:xfrm>
-          <a:prstGeom prst="rect">
-            <a:avLst/>
-          </a:prstGeom>
-        </p:spPr>
-        <p:txBody>
-          <a:bodyPr vert="horz" wrap="square" lIns="0" tIns="12700" rIns="0" bIns="0" rtlCol="0">
-            <a:spAutoFit/>
-          </a:bodyPr>
-          <a:lstStyle/>
-          <a:p>
-            <a:pPr marL="12700">
-              <a:lnSpc>
-                <a:spcPct val="100000"/>
-              </a:lnSpc>
-              <a:spcBef>
-                <a:spcPts val="100"/>
-              </a:spcBef>
-            </a:pPr>
-            <a:r>
-              <a:rPr sz="1800" dirty="0">
-                <a:solidFill>
-                  <a:srgbClr val="2A9FBB"/>
-                </a:solidFill>
-                <a:latin typeface="Segoe UI" panose="020B0502040204020203"/>
-                <a:cs typeface="Segoe UI" panose="020B0502040204020203"/>
-              </a:rPr>
-              <a:t>-</a:t>
-            </a:r>
-            <a:endParaRPr sz="1800">
-              <a:latin typeface="Segoe UI" panose="020B0502040204020203"/>
-              <a:cs typeface="Segoe UI" panose="020B0502040204020203"/>
-            </a:endParaRPr>
-          </a:p>
-          <a:p>
-            <a:pPr marL="12700">
-              <a:lnSpc>
-                <a:spcPct val="100000"/>
-              </a:lnSpc>
-              <a:spcBef>
-                <a:spcPts val="1320"/>
-              </a:spcBef>
-            </a:pPr>
-            <a:r>
-              <a:rPr sz="1800" dirty="0">
-                <a:solidFill>
-                  <a:srgbClr val="2A9FBB"/>
-                </a:solidFill>
-                <a:latin typeface="Segoe UI" panose="020B0502040204020203"/>
-                <a:cs typeface="Segoe UI" panose="020B0502040204020203"/>
-              </a:rPr>
-              <a:t>-</a:t>
-            </a:r>
-            <a:endParaRPr sz="1800">
-              <a:latin typeface="Segoe UI" panose="020B0502040204020203"/>
-              <a:cs typeface="Segoe UI" panose="020B0502040204020203"/>
-            </a:endParaRPr>
-          </a:p>
-        </p:txBody>
-      </p:sp>
       <p:pic>
         <p:nvPicPr>
           <p:cNvPr id="8" name="object 8"/>
@@ -18007,28 +17938,6 @@
           <a:xfrm>
             <a:off x="5768975" y="2844038"/>
             <a:ext cx="2236470" cy="365760"/>
-          </a:xfrm>
-          <a:prstGeom prst="rect">
-            <a:avLst/>
-          </a:prstGeom>
-        </p:spPr>
-      </p:pic>
-      <p:pic>
-        <p:nvPicPr>
-          <p:cNvPr id="9" name="object 9"/>
-          <p:cNvPicPr/>
-          <p:nvPr/>
-        </p:nvPicPr>
-        <p:blipFill>
-          <a:blip r:embed="rId6" cstate="print"/>
-          <a:stretch>
-            <a:fillRect/>
-          </a:stretch>
-        </p:blipFill>
-        <p:spPr>
-          <a:xfrm>
-            <a:off x="5768975" y="3286378"/>
-            <a:ext cx="1527809" cy="365760"/>
           </a:xfrm>
           <a:prstGeom prst="rect">
             <a:avLst/>
@@ -18288,6 +18197,107 @@
         <p:cNvGrpSpPr/>
         <p:nvPr/>
       </p:nvGrpSpPr>
+      <p:grpSpPr/>
+      <p:sp>
+        <p:nvSpPr>
+          <p:cNvPr id="6" name="Title 5"/>
+          <p:cNvSpPr>
+            <a:spLocks noGrp="1"/>
+          </p:cNvSpPr>
+          <p:nvPr>
+            <p:ph type="title"/>
+          </p:nvPr>
+        </p:nvSpPr>
+        <p:spPr/>
+        <p:txBody>
+          <a:bodyPr/>
+          <a:p>
+            <a:endParaRPr lang="en-US"/>
+          </a:p>
+        </p:txBody>
+      </p:sp>
+      <p:sp>
+        <p:nvSpPr>
+          <p:cNvPr id="4" name="Slide Number Placeholder 3"/>
+          <p:cNvSpPr>
+            <a:spLocks noGrp="1"/>
+          </p:cNvSpPr>
+          <p:nvPr>
+            <p:ph type="sldNum" sz="quarter" idx="7"/>
+          </p:nvPr>
+        </p:nvSpPr>
+        <p:spPr/>
+        <p:txBody>
+          <a:bodyPr/>
+          <a:p>
+            <a:fld id="{B6F15528-21DE-4FAA-801E-634DDDAF4B2B}" type="slidenum">
+              <a:rPr/>
+            </a:fld>
+            <a:endParaRPr/>
+          </a:p>
+        </p:txBody>
+      </p:sp>
+      <p:sp>
+        <p:nvSpPr>
+          <p:cNvPr id="7" name="Content Placeholder 6"/>
+          <p:cNvSpPr>
+            <a:spLocks noGrp="1"/>
+          </p:cNvSpPr>
+          <p:nvPr>
+            <p:ph sz="half" idx="3"/>
+          </p:nvPr>
+        </p:nvSpPr>
+        <p:spPr/>
+        <p:txBody>
+          <a:bodyPr/>
+          <a:p>
+            <a:endParaRPr lang="en-US"/>
+          </a:p>
+        </p:txBody>
+      </p:sp>
+      <p:pic>
+        <p:nvPicPr>
+          <p:cNvPr id="5" name="Content Placeholder 4"/>
+          <p:cNvPicPr>
+            <a:picLocks noChangeAspect="1"/>
+          </p:cNvPicPr>
+          <p:nvPr>
+            <p:ph sz="half" idx="2"/>
+          </p:nvPr>
+        </p:nvPicPr>
+        <p:blipFill>
+          <a:blip r:embed="rId1"/>
+          <a:stretch>
+            <a:fillRect/>
+          </a:stretch>
+        </p:blipFill>
+        <p:spPr>
+          <a:xfrm>
+            <a:off x="304800" y="304800"/>
+            <a:ext cx="11483975" cy="5720080"/>
+          </a:xfrm>
+          <a:prstGeom prst="rect">
+            <a:avLst/>
+          </a:prstGeom>
+        </p:spPr>
+      </p:pic>
+    </p:spTree>
+  </p:cSld>
+  <p:clrMapOvr>
+    <a:masterClrMapping/>
+  </p:clrMapOvr>
+</p:sld>
+</file>
+
+<file path=ppt/slides/slide29.xml><?xml version="1.0" encoding="utf-8"?>
+<p:sld xmlns:a="http://schemas.openxmlformats.org/drawingml/2006/main" xmlns:r="http://schemas.openxmlformats.org/officeDocument/2006/relationships" xmlns:p="http://schemas.openxmlformats.org/presentationml/2006/main">
+  <p:cSld>
+    <p:spTree>
+      <p:nvGrpSpPr>
+        <p:cNvPr id="1" name=""/>
+        <p:cNvGrpSpPr/>
+        <p:nvPr/>
+      </p:nvGrpSpPr>
       <p:grpSpPr>
         <a:xfrm>
           <a:off x="0" y="0"/>
@@ -18332,7 +18342,7 @@
         </p:blipFill>
         <p:spPr>
           <a:xfrm>
-            <a:off x="5240146" y="2023872"/>
+            <a:off x="5240146" y="1338072"/>
             <a:ext cx="3257930" cy="365760"/>
           </a:xfrm>
           <a:prstGeom prst="rect">
@@ -18354,7 +18364,7 @@
         </p:blipFill>
         <p:spPr>
           <a:xfrm>
-            <a:off x="5240146" y="2618232"/>
+            <a:off x="5240146" y="1932432"/>
             <a:ext cx="4463796" cy="365760"/>
           </a:xfrm>
           <a:prstGeom prst="rect">
@@ -18376,7 +18386,7 @@
         </p:blipFill>
         <p:spPr>
           <a:xfrm>
-            <a:off x="5240146" y="3212845"/>
+            <a:off x="5240146" y="2527045"/>
             <a:ext cx="2429382" cy="365760"/>
           </a:xfrm>
           <a:prstGeom prst="rect">
@@ -18392,7 +18402,7 @@
         </p:nvSpPr>
         <p:spPr>
           <a:xfrm>
-            <a:off x="5466715" y="3706114"/>
+            <a:off x="5466715" y="3020314"/>
             <a:ext cx="116839" cy="299720"/>
           </a:xfrm>
           <a:prstGeom prst="rect">
@@ -18444,7 +18454,7 @@
         </p:blipFill>
         <p:spPr>
           <a:xfrm>
-            <a:off x="5768975" y="3654805"/>
+            <a:off x="5768975" y="2969005"/>
             <a:ext cx="3311398" cy="365760"/>
           </a:xfrm>
           <a:prstGeom prst="rect">
@@ -18466,7 +18476,7 @@
         </p:blipFill>
         <p:spPr>
           <a:xfrm>
-            <a:off x="5240146" y="4248861"/>
+            <a:off x="5240146" y="3563061"/>
             <a:ext cx="4869941" cy="366064"/>
           </a:xfrm>
           <a:prstGeom prst="rect">
@@ -18476,7 +18486,7 @@
       </p:pic>
       <p:pic>
         <p:nvPicPr>
-          <p:cNvPr id="15" name="object 15"/>
+          <p:cNvPr id="9" name="object 9"/>
           <p:cNvPicPr/>
           <p:nvPr/>
         </p:nvPicPr>
@@ -18488,8 +18498,8 @@
         </p:blipFill>
         <p:spPr>
           <a:xfrm>
-            <a:off x="1239926" y="1947621"/>
-            <a:ext cx="2463165" cy="548944"/>
+            <a:off x="5240146" y="4158107"/>
+            <a:ext cx="3261105" cy="365759"/>
           </a:xfrm>
           <a:prstGeom prst="rect">
             <a:avLst/>
@@ -18498,25 +18508,140 @@
       </p:pic>
       <p:sp>
         <p:nvSpPr>
-          <p:cNvPr id="16" name="Slide Number Placeholder 15"/>
-          <p:cNvSpPr>
-            <a:spLocks noGrp="1"/>
-          </p:cNvSpPr>
-          <p:nvPr>
-            <p:ph type="sldNum" sz="quarter" idx="7"/>
-          </p:nvPr>
+          <p:cNvPr id="10" name="object 10"/>
+          <p:cNvSpPr txBox="1"/>
+          <p:nvPr/>
         </p:nvSpPr>
-        <p:spPr/>
+        <p:spPr>
+          <a:xfrm>
+            <a:off x="5466715" y="4651375"/>
+            <a:ext cx="116839" cy="742315"/>
+          </a:xfrm>
+          <a:prstGeom prst="rect">
+            <a:avLst/>
+          </a:prstGeom>
+        </p:spPr>
         <p:txBody>
-          <a:bodyPr/>
+          <a:bodyPr vert="horz" wrap="square" lIns="0" tIns="12700" rIns="0" bIns="0" rtlCol="0">
+            <a:spAutoFit/>
+          </a:bodyPr>
+          <a:lstStyle/>
           <a:p>
-            <a:fld id="{B6F15528-21DE-4FAA-801E-634DDDAF4B2B}" type="slidenum">
-              <a:rPr/>
-            </a:fld>
-            <a:endParaRPr/>
+            <a:pPr marL="12700">
+              <a:lnSpc>
+                <a:spcPct val="100000"/>
+              </a:lnSpc>
+              <a:spcBef>
+                <a:spcPts val="100"/>
+              </a:spcBef>
+            </a:pPr>
+            <a:r>
+              <a:rPr sz="1800" dirty="0">
+                <a:solidFill>
+                  <a:srgbClr val="EF5A28"/>
+                </a:solidFill>
+                <a:latin typeface="Segoe UI" panose="020B0502040204020203"/>
+                <a:cs typeface="Segoe UI" panose="020B0502040204020203"/>
+              </a:rPr>
+              <a:t>-</a:t>
+            </a:r>
+            <a:endParaRPr sz="1800">
+              <a:latin typeface="Segoe UI" panose="020B0502040204020203"/>
+              <a:cs typeface="Segoe UI" panose="020B0502040204020203"/>
+            </a:endParaRPr>
+          </a:p>
+          <a:p>
+            <a:pPr marL="12700">
+              <a:lnSpc>
+                <a:spcPct val="100000"/>
+              </a:lnSpc>
+              <a:spcBef>
+                <a:spcPts val="1320"/>
+              </a:spcBef>
+            </a:pPr>
+            <a:r>
+              <a:rPr sz="1800" dirty="0">
+                <a:solidFill>
+                  <a:srgbClr val="EF5A28"/>
+                </a:solidFill>
+                <a:latin typeface="Segoe UI" panose="020B0502040204020203"/>
+                <a:cs typeface="Segoe UI" panose="020B0502040204020203"/>
+              </a:rPr>
+              <a:t>-</a:t>
+            </a:r>
+            <a:endParaRPr sz="1800">
+              <a:latin typeface="Segoe UI" panose="020B0502040204020203"/>
+              <a:cs typeface="Segoe UI" panose="020B0502040204020203"/>
+            </a:endParaRPr>
           </a:p>
         </p:txBody>
       </p:sp>
+      <p:pic>
+        <p:nvPicPr>
+          <p:cNvPr id="11" name="object 11"/>
+          <p:cNvPicPr/>
+          <p:nvPr/>
+        </p:nvPicPr>
+        <p:blipFill>
+          <a:blip r:embed="rId8" cstate="print"/>
+          <a:stretch>
+            <a:fillRect/>
+          </a:stretch>
+        </p:blipFill>
+        <p:spPr>
+          <a:xfrm>
+            <a:off x="5768975" y="4600016"/>
+            <a:ext cx="3920617" cy="366064"/>
+          </a:xfrm>
+          <a:prstGeom prst="rect">
+            <a:avLst/>
+          </a:prstGeom>
+        </p:spPr>
+      </p:pic>
+      <p:pic>
+        <p:nvPicPr>
+          <p:cNvPr id="12" name="object 12"/>
+          <p:cNvPicPr/>
+          <p:nvPr/>
+        </p:nvPicPr>
+        <p:blipFill>
+          <a:blip r:embed="rId9" cstate="print"/>
+          <a:stretch>
+            <a:fillRect/>
+          </a:stretch>
+        </p:blipFill>
+        <p:spPr>
+          <a:xfrm>
+            <a:off x="5768975" y="5042280"/>
+            <a:ext cx="2241423" cy="365760"/>
+          </a:xfrm>
+          <a:prstGeom prst="rect">
+            <a:avLst/>
+          </a:prstGeom>
+        </p:spPr>
+      </p:pic>
+      <p:pic>
+        <p:nvPicPr>
+          <p:cNvPr id="15" name="object 15"/>
+          <p:cNvPicPr/>
+          <p:nvPr/>
+        </p:nvPicPr>
+        <p:blipFill>
+          <a:blip r:embed="rId10" cstate="print"/>
+          <a:stretch>
+            <a:fillRect/>
+          </a:stretch>
+        </p:blipFill>
+        <p:spPr>
+          <a:xfrm>
+            <a:off x="1239926" y="1947621"/>
+            <a:ext cx="2463165" cy="548944"/>
+          </a:xfrm>
+          <a:prstGeom prst="rect">
+            <a:avLst/>
+          </a:prstGeom>
+        </p:spPr>
+      </p:pic>
     </p:spTree>
   </p:cSld>
   <p:clrMapOvr>

</xml_diff>

<commit_message>
Updated Day 5 - Asssignments, Slides and Supporting Materials.
</commit_message>
<xml_diff>
--- a/Day 5/Slides/3. Backing Up Volumes/backing-up-volumes-slides.pptx
+++ b/Day 5/Slides/3. Backing Up Volumes/backing-up-volumes-slides.pptx
@@ -10329,34 +10329,12 @@
       </p:grpSp>
       <p:pic>
         <p:nvPicPr>
-          <p:cNvPr id="20" name="object 20"/>
+          <p:cNvPr id="21" name="object 21"/>
           <p:cNvPicPr/>
           <p:nvPr/>
         </p:nvPicPr>
         <p:blipFill>
           <a:blip r:embed="rId11" cstate="print"/>
-          <a:stretch>
-            <a:fillRect/>
-          </a:stretch>
-        </p:blipFill>
-        <p:spPr>
-          <a:xfrm>
-            <a:off x="1076212" y="2630690"/>
-            <a:ext cx="564867" cy="639546"/>
-          </a:xfrm>
-          <a:prstGeom prst="rect">
-            <a:avLst/>
-          </a:prstGeom>
-        </p:spPr>
-      </p:pic>
-      <p:pic>
-        <p:nvPicPr>
-          <p:cNvPr id="21" name="object 21"/>
-          <p:cNvPicPr/>
-          <p:nvPr/>
-        </p:nvPicPr>
-        <p:blipFill>
-          <a:blip r:embed="rId12" cstate="print"/>
           <a:stretch>
             <a:fillRect/>
           </a:stretch>
@@ -10378,7 +10356,7 @@
           <p:nvPr/>
         </p:nvPicPr>
         <p:blipFill>
-          <a:blip r:embed="rId13" cstate="print"/>
+          <a:blip r:embed="rId12" cstate="print"/>
           <a:stretch>
             <a:fillRect/>
           </a:stretch>
@@ -10400,7 +10378,7 @@
           <p:nvPr/>
         </p:nvPicPr>
         <p:blipFill>
-          <a:blip r:embed="rId14" cstate="print"/>
+          <a:blip r:embed="rId13" cstate="print"/>
           <a:stretch>
             <a:fillRect/>
           </a:stretch>
@@ -10422,7 +10400,7 @@
           <p:nvPr/>
         </p:nvPicPr>
         <p:blipFill>
-          <a:blip r:embed="rId15" cstate="print"/>
+          <a:blip r:embed="rId14" cstate="print"/>
           <a:stretch>
             <a:fillRect/>
           </a:stretch>
@@ -10466,7 +10444,7 @@
           <p:nvPr/>
         </p:nvPicPr>
         <p:blipFill>
-          <a:blip r:embed="rId15" cstate="print"/>
+          <a:blip r:embed="rId14" cstate="print"/>
           <a:stretch>
             <a:fillRect/>
           </a:stretch>
@@ -10488,7 +10466,7 @@
           <p:nvPr/>
         </p:nvPicPr>
         <p:blipFill>
-          <a:blip r:embed="rId16" cstate="print"/>
+          <a:blip r:embed="rId15" cstate="print"/>
           <a:stretch>
             <a:fillRect/>
           </a:stretch>
@@ -10510,7 +10488,7 @@
           <p:nvPr/>
         </p:nvPicPr>
         <p:blipFill>
-          <a:blip r:embed="rId17" cstate="print"/>
+          <a:blip r:embed="rId16" cstate="print"/>
           <a:stretch>
             <a:fillRect/>
           </a:stretch>
@@ -10532,7 +10510,7 @@
           <p:nvPr/>
         </p:nvPicPr>
         <p:blipFill>
-          <a:blip r:embed="rId14" cstate="print"/>
+          <a:blip r:embed="rId13" cstate="print"/>
           <a:stretch>
             <a:fillRect/>
           </a:stretch>
@@ -10554,7 +10532,7 @@
           <p:nvPr/>
         </p:nvPicPr>
         <p:blipFill>
-          <a:blip r:embed="rId18" cstate="print"/>
+          <a:blip r:embed="rId17" cstate="print"/>
           <a:stretch>
             <a:fillRect/>
           </a:stretch>
@@ -13499,34 +13477,12 @@
       </p:grpSp>
       <p:pic>
         <p:nvPicPr>
-          <p:cNvPr id="24" name="object 24"/>
+          <p:cNvPr id="25" name="object 25"/>
           <p:cNvPicPr/>
           <p:nvPr/>
         </p:nvPicPr>
         <p:blipFill>
           <a:blip r:embed="rId12" cstate="print"/>
-          <a:stretch>
-            <a:fillRect/>
-          </a:stretch>
-        </p:blipFill>
-        <p:spPr>
-          <a:xfrm>
-            <a:off x="1076212" y="2630690"/>
-            <a:ext cx="564867" cy="639546"/>
-          </a:xfrm>
-          <a:prstGeom prst="rect">
-            <a:avLst/>
-          </a:prstGeom>
-        </p:spPr>
-      </p:pic>
-      <p:pic>
-        <p:nvPicPr>
-          <p:cNvPr id="25" name="object 25"/>
-          <p:cNvPicPr/>
-          <p:nvPr/>
-        </p:nvPicPr>
-        <p:blipFill>
-          <a:blip r:embed="rId13" cstate="print"/>
           <a:stretch>
             <a:fillRect/>
           </a:stretch>
@@ -13548,7 +13504,7 @@
           <p:nvPr/>
         </p:nvPicPr>
         <p:blipFill>
-          <a:blip r:embed="rId14" cstate="print"/>
+          <a:blip r:embed="rId13" cstate="print"/>
           <a:stretch>
             <a:fillRect/>
           </a:stretch>
@@ -13570,7 +13526,7 @@
           <p:nvPr/>
         </p:nvPicPr>
         <p:blipFill>
-          <a:blip r:embed="rId15" cstate="print"/>
+          <a:blip r:embed="rId14" cstate="print"/>
           <a:stretch>
             <a:fillRect/>
           </a:stretch>
@@ -13592,7 +13548,7 @@
           <p:nvPr/>
         </p:nvPicPr>
         <p:blipFill>
-          <a:blip r:embed="rId16" cstate="print"/>
+          <a:blip r:embed="rId15" cstate="print"/>
           <a:stretch>
             <a:fillRect/>
           </a:stretch>
@@ -13636,7 +13592,7 @@
           <p:nvPr/>
         </p:nvPicPr>
         <p:blipFill>
-          <a:blip r:embed="rId16" cstate="print"/>
+          <a:blip r:embed="rId15" cstate="print"/>
           <a:stretch>
             <a:fillRect/>
           </a:stretch>
@@ -13658,7 +13614,7 @@
           <p:nvPr/>
         </p:nvPicPr>
         <p:blipFill>
-          <a:blip r:embed="rId17" cstate="print"/>
+          <a:blip r:embed="rId16" cstate="print"/>
           <a:stretch>
             <a:fillRect/>
           </a:stretch>
@@ -13680,7 +13636,7 @@
           <p:nvPr/>
         </p:nvPicPr>
         <p:blipFill>
-          <a:blip r:embed="rId18" cstate="print"/>
+          <a:blip r:embed="rId17" cstate="print"/>
           <a:stretch>
             <a:fillRect/>
           </a:stretch>
@@ -13702,7 +13658,7 @@
           <p:nvPr/>
         </p:nvPicPr>
         <p:blipFill>
-          <a:blip r:embed="rId15" cstate="print"/>
+          <a:blip r:embed="rId14" cstate="print"/>
           <a:stretch>
             <a:fillRect/>
           </a:stretch>
@@ -13724,7 +13680,7 @@
           <p:nvPr/>
         </p:nvPicPr>
         <p:blipFill>
-          <a:blip r:embed="rId19" cstate="print"/>
+          <a:blip r:embed="rId18" cstate="print"/>
           <a:stretch>
             <a:fillRect/>
           </a:stretch>
@@ -13746,7 +13702,7 @@
           <p:nvPr/>
         </p:nvPicPr>
         <p:blipFill>
-          <a:blip r:embed="rId19" cstate="print"/>
+          <a:blip r:embed="rId18" cstate="print"/>
           <a:stretch>
             <a:fillRect/>
           </a:stretch>
@@ -15017,34 +14973,12 @@
       </p:grpSp>
       <p:pic>
         <p:nvPicPr>
-          <p:cNvPr id="24" name="object 24"/>
+          <p:cNvPr id="25" name="object 25"/>
           <p:cNvPicPr/>
           <p:nvPr/>
         </p:nvPicPr>
         <p:blipFill>
           <a:blip r:embed="rId12" cstate="print"/>
-          <a:stretch>
-            <a:fillRect/>
-          </a:stretch>
-        </p:blipFill>
-        <p:spPr>
-          <a:xfrm>
-            <a:off x="1076212" y="2630690"/>
-            <a:ext cx="564867" cy="639546"/>
-          </a:xfrm>
-          <a:prstGeom prst="rect">
-            <a:avLst/>
-          </a:prstGeom>
-        </p:spPr>
-      </p:pic>
-      <p:pic>
-        <p:nvPicPr>
-          <p:cNvPr id="25" name="object 25"/>
-          <p:cNvPicPr/>
-          <p:nvPr/>
-        </p:nvPicPr>
-        <p:blipFill>
-          <a:blip r:embed="rId13" cstate="print"/>
           <a:stretch>
             <a:fillRect/>
           </a:stretch>
@@ -15066,7 +15000,7 @@
           <p:nvPr/>
         </p:nvPicPr>
         <p:blipFill>
-          <a:blip r:embed="rId14" cstate="print"/>
+          <a:blip r:embed="rId13" cstate="print"/>
           <a:stretch>
             <a:fillRect/>
           </a:stretch>
@@ -15088,7 +15022,7 @@
           <p:nvPr/>
         </p:nvPicPr>
         <p:blipFill>
-          <a:blip r:embed="rId15" cstate="print"/>
+          <a:blip r:embed="rId14" cstate="print"/>
           <a:stretch>
             <a:fillRect/>
           </a:stretch>
@@ -15110,7 +15044,7 @@
           <p:nvPr/>
         </p:nvPicPr>
         <p:blipFill>
-          <a:blip r:embed="rId16" cstate="print"/>
+          <a:blip r:embed="rId15" cstate="print"/>
           <a:stretch>
             <a:fillRect/>
           </a:stretch>
@@ -15132,7 +15066,7 @@
           <p:nvPr/>
         </p:nvPicPr>
         <p:blipFill>
-          <a:blip r:embed="rId17" cstate="print"/>
+          <a:blip r:embed="rId16" cstate="print"/>
           <a:stretch>
             <a:fillRect/>
           </a:stretch>
@@ -15154,7 +15088,7 @@
           <p:nvPr/>
         </p:nvPicPr>
         <p:blipFill>
-          <a:blip r:embed="rId18" cstate="print"/>
+          <a:blip r:embed="rId17" cstate="print"/>
           <a:stretch>
             <a:fillRect/>
           </a:stretch>
@@ -15176,7 +15110,7 @@
           <p:nvPr/>
         </p:nvPicPr>
         <p:blipFill>
-          <a:blip r:embed="rId17" cstate="print"/>
+          <a:blip r:embed="rId16" cstate="print"/>
           <a:stretch>
             <a:fillRect/>
           </a:stretch>
@@ -15198,7 +15132,7 @@
           <p:nvPr/>
         </p:nvPicPr>
         <p:blipFill>
-          <a:blip r:embed="rId19" cstate="print"/>
+          <a:blip r:embed="rId18" cstate="print"/>
           <a:stretch>
             <a:fillRect/>
           </a:stretch>
@@ -15220,7 +15154,7 @@
           <p:nvPr/>
         </p:nvPicPr>
         <p:blipFill>
-          <a:blip r:embed="rId20" cstate="print"/>
+          <a:blip r:embed="rId19" cstate="print"/>
           <a:stretch>
             <a:fillRect/>
           </a:stretch>
@@ -15242,7 +15176,7 @@
           <p:nvPr/>
         </p:nvPicPr>
         <p:blipFill>
-          <a:blip r:embed="rId15" cstate="print"/>
+          <a:blip r:embed="rId14" cstate="print"/>
           <a:stretch>
             <a:fillRect/>
           </a:stretch>
@@ -15264,7 +15198,7 @@
           <p:nvPr/>
         </p:nvPicPr>
         <p:blipFill>
-          <a:blip r:embed="rId21" cstate="print"/>
+          <a:blip r:embed="rId20" cstate="print"/>
           <a:stretch>
             <a:fillRect/>
           </a:stretch>
@@ -15286,7 +15220,7 @@
           <p:nvPr/>
         </p:nvPicPr>
         <p:blipFill>
-          <a:blip r:embed="rId21" cstate="print"/>
+          <a:blip r:embed="rId20" cstate="print"/>
           <a:stretch>
             <a:fillRect/>
           </a:stretch>
@@ -15308,7 +15242,7 @@
           <p:nvPr/>
         </p:nvPicPr>
         <p:blipFill>
-          <a:blip r:embed="rId19" cstate="print"/>
+          <a:blip r:embed="rId18" cstate="print"/>
           <a:stretch>
             <a:fillRect/>
           </a:stretch>
@@ -15330,7 +15264,7 @@
           <p:nvPr/>
         </p:nvPicPr>
         <p:blipFill>
-          <a:blip r:embed="rId20" cstate="print"/>
+          <a:blip r:embed="rId19" cstate="print"/>
           <a:stretch>
             <a:fillRect/>
           </a:stretch>
@@ -16141,34 +16075,12 @@
       </p:grpSp>
       <p:pic>
         <p:nvPicPr>
-          <p:cNvPr id="16" name="object 16"/>
+          <p:cNvPr id="17" name="object 17"/>
           <p:cNvPicPr/>
           <p:nvPr/>
         </p:nvPicPr>
         <p:blipFill>
           <a:blip r:embed="rId9" cstate="print"/>
-          <a:stretch>
-            <a:fillRect/>
-          </a:stretch>
-        </p:blipFill>
-        <p:spPr>
-          <a:xfrm>
-            <a:off x="1076212" y="2630690"/>
-            <a:ext cx="564867" cy="639546"/>
-          </a:xfrm>
-          <a:prstGeom prst="rect">
-            <a:avLst/>
-          </a:prstGeom>
-        </p:spPr>
-      </p:pic>
-      <p:pic>
-        <p:nvPicPr>
-          <p:cNvPr id="17" name="object 17"/>
-          <p:cNvPicPr/>
-          <p:nvPr/>
-        </p:nvPicPr>
-        <p:blipFill>
-          <a:blip r:embed="rId10" cstate="print"/>
           <a:stretch>
             <a:fillRect/>
           </a:stretch>
@@ -16190,7 +16102,7 @@
           <p:nvPr/>
         </p:nvPicPr>
         <p:blipFill>
-          <a:blip r:embed="rId11" cstate="print"/>
+          <a:blip r:embed="rId10" cstate="print"/>
           <a:stretch>
             <a:fillRect/>
           </a:stretch>
@@ -16212,7 +16124,7 @@
           <p:nvPr/>
         </p:nvPicPr>
         <p:blipFill>
-          <a:blip r:embed="rId12" cstate="print"/>
+          <a:blip r:embed="rId11" cstate="print"/>
           <a:stretch>
             <a:fillRect/>
           </a:stretch>
@@ -16234,7 +16146,7 @@
           <p:nvPr/>
         </p:nvPicPr>
         <p:blipFill>
-          <a:blip r:embed="rId13" cstate="print"/>
+          <a:blip r:embed="rId12" cstate="print"/>
           <a:stretch>
             <a:fillRect/>
           </a:stretch>
@@ -16256,7 +16168,7 @@
           <p:nvPr/>
         </p:nvPicPr>
         <p:blipFill>
-          <a:blip r:embed="rId12" cstate="print"/>
+          <a:blip r:embed="rId11" cstate="print"/>
           <a:stretch>
             <a:fillRect/>
           </a:stretch>
@@ -16278,7 +16190,7 @@
           <p:nvPr/>
         </p:nvPicPr>
         <p:blipFill>
-          <a:blip r:embed="rId14" cstate="print"/>
+          <a:blip r:embed="rId13" cstate="print"/>
           <a:stretch>
             <a:fillRect/>
           </a:stretch>
@@ -16300,7 +16212,7 @@
           <p:nvPr/>
         </p:nvPicPr>
         <p:blipFill>
-          <a:blip r:embed="rId14" cstate="print"/>
+          <a:blip r:embed="rId13" cstate="print"/>
           <a:stretch>
             <a:fillRect/>
           </a:stretch>
@@ -16322,7 +16234,7 @@
           <p:nvPr/>
         </p:nvPicPr>
         <p:blipFill>
-          <a:blip r:embed="rId15" cstate="print"/>
+          <a:blip r:embed="rId14" cstate="print"/>
           <a:stretch>
             <a:fillRect/>
           </a:stretch>
@@ -16344,7 +16256,7 @@
           <p:nvPr/>
         </p:nvPicPr>
         <p:blipFill>
-          <a:blip r:embed="rId16" cstate="print"/>
+          <a:blip r:embed="rId15" cstate="print"/>
           <a:stretch>
             <a:fillRect/>
           </a:stretch>
@@ -17155,34 +17067,12 @@
       </p:grpSp>
       <p:pic>
         <p:nvPicPr>
-          <p:cNvPr id="16" name="object 16"/>
+          <p:cNvPr id="17" name="object 17"/>
           <p:cNvPicPr/>
           <p:nvPr/>
         </p:nvPicPr>
         <p:blipFill>
           <a:blip r:embed="rId9" cstate="print"/>
-          <a:stretch>
-            <a:fillRect/>
-          </a:stretch>
-        </p:blipFill>
-        <p:spPr>
-          <a:xfrm>
-            <a:off x="1076212" y="2630690"/>
-            <a:ext cx="564867" cy="639546"/>
-          </a:xfrm>
-          <a:prstGeom prst="rect">
-            <a:avLst/>
-          </a:prstGeom>
-        </p:spPr>
-      </p:pic>
-      <p:pic>
-        <p:nvPicPr>
-          <p:cNvPr id="17" name="object 17"/>
-          <p:cNvPicPr/>
-          <p:nvPr/>
-        </p:nvPicPr>
-        <p:blipFill>
-          <a:blip r:embed="rId10" cstate="print"/>
           <a:stretch>
             <a:fillRect/>
           </a:stretch>
@@ -17204,7 +17094,7 @@
           <p:nvPr/>
         </p:nvPicPr>
         <p:blipFill>
-          <a:blip r:embed="rId11" cstate="print"/>
+          <a:blip r:embed="rId10" cstate="print"/>
           <a:stretch>
             <a:fillRect/>
           </a:stretch>
@@ -17226,7 +17116,7 @@
           <p:nvPr/>
         </p:nvPicPr>
         <p:blipFill>
-          <a:blip r:embed="rId12" cstate="print"/>
+          <a:blip r:embed="rId11" cstate="print"/>
           <a:stretch>
             <a:fillRect/>
           </a:stretch>
@@ -17248,7 +17138,7 @@
           <p:nvPr/>
         </p:nvPicPr>
         <p:blipFill>
-          <a:blip r:embed="rId11" cstate="print"/>
+          <a:blip r:embed="rId10" cstate="print"/>
           <a:stretch>
             <a:fillRect/>
           </a:stretch>
@@ -17270,7 +17160,7 @@
           <p:nvPr/>
         </p:nvPicPr>
         <p:blipFill>
-          <a:blip r:embed="rId13" cstate="print"/>
+          <a:blip r:embed="rId12" cstate="print"/>
           <a:stretch>
             <a:fillRect/>
           </a:stretch>
@@ -17292,7 +17182,7 @@
           <p:nvPr/>
         </p:nvPicPr>
         <p:blipFill>
-          <a:blip r:embed="rId13" cstate="print"/>
+          <a:blip r:embed="rId12" cstate="print"/>
           <a:stretch>
             <a:fillRect/>
           </a:stretch>
@@ -17314,7 +17204,7 @@
           <p:nvPr/>
         </p:nvPicPr>
         <p:blipFill>
-          <a:blip r:embed="rId14" cstate="print"/>
+          <a:blip r:embed="rId13" cstate="print"/>
           <a:stretch>
             <a:fillRect/>
           </a:stretch>
@@ -17336,7 +17226,7 @@
           <p:nvPr/>
         </p:nvPicPr>
         <p:blipFill>
-          <a:blip r:embed="rId15" cstate="print"/>
+          <a:blip r:embed="rId14" cstate="print"/>
           <a:stretch>
             <a:fillRect/>
           </a:stretch>

</xml_diff>